<commit_message>
merge Gao's HAM rebuild workflow
</commit_message>
<xml_diff>
--- a/PPT/DESIGN3.4 HAM-shift.pptx
+++ b/PPT/DESIGN3.4 HAM-shift.pptx
@@ -5,12 +5,12 @@
     <p:sldMasterId id="2147483648" r:id="rId1"/>
   </p:sldMasterIdLst>
   <p:sldIdLst>
-    <p:sldId id="256" r:id="rId3"/>
+    <p:sldId id="256" r:id="rId2"/>
   </p:sldIdLst>
-  <p:sldSz cx="7199630" cy="8999855"/>
+  <p:sldSz cx="7199313" cy="8999538"/>
   <p:notesSz cx="6858000" cy="9144000"/>
   <p:custDataLst>
-    <p:tags r:id="rId7"/>
+    <p:tags r:id="rId3"/>
   </p:custDataLst>
   <p:defaultTextStyle>
     <a:defPPr>
@@ -107,6 +107,11 @@
       </a:defRPr>
     </a:lvl9pPr>
   </p:defaultTextStyle>
+  <p:extLst>
+    <p:ext uri="{EFAFB233-063F-42B5-8137-9DF3F51BA10A}">
+      <p15:sldGuideLst xmlns:p15="http://schemas.microsoft.com/office/powerpoint/2012/main"/>
+    </p:ext>
+  </p:extLst>
 </p:presentation>
 </file>
 
@@ -152,10 +157,9 @@
           </a:lstStyle>
           <a:p>
             <a:r>
-              <a:rPr lang="zh-CN" altLang="en-US" smtClean="0"/>
+              <a:rPr lang="zh-CN" altLang="en-US"/>
               <a:t>单击此处编辑母版标题样式</a:t>
             </a:r>
-            <a:endParaRPr lang="zh-CN" altLang="en-US"/>
           </a:p>
         </p:txBody>
       </p:sp>
@@ -217,10 +221,9 @@
           </a:lstStyle>
           <a:p>
             <a:r>
-              <a:rPr lang="zh-CN" altLang="en-US" smtClean="0"/>
+              <a:rPr lang="zh-CN" altLang="en-US"/>
               <a:t>单击此处编辑母版副标题样式</a:t>
             </a:r>
-            <a:endParaRPr lang="zh-CN" altLang="en-US"/>
           </a:p>
         </p:txBody>
       </p:sp>
@@ -241,6 +244,7 @@
           <a:p>
             <a:fld id="{D997B5FA-0921-464F-AAE1-844C04324D75}" type="datetimeFigureOut">
               <a:rPr lang="zh-CN" altLang="en-US" smtClean="0"/>
+              <a:t>2023/1/12</a:t>
             </a:fld>
             <a:endParaRPr lang="zh-CN" altLang="en-US"/>
           </a:p>
@@ -282,6 +286,7 @@
           <a:p>
             <a:fld id="{565CE74E-AB26-4998-AD42-012C4C1AD076}" type="slidenum">
               <a:rPr lang="zh-CN" altLang="en-US" smtClean="0"/>
+              <a:t>‹#›</a:t>
             </a:fld>
             <a:endParaRPr lang="zh-CN" altLang="en-US"/>
           </a:p>
@@ -328,10 +333,9 @@
           <a:lstStyle/>
           <a:p>
             <a:r>
-              <a:rPr lang="zh-CN" altLang="en-US" smtClean="0"/>
+              <a:rPr lang="zh-CN" altLang="en-US"/>
               <a:t>单击此处编辑母版标题样式</a:t>
             </a:r>
-            <a:endParaRPr lang="zh-CN" altLang="en-US"/>
           </a:p>
         </p:txBody>
       </p:sp>
@@ -352,42 +356,37 @@
           <a:p>
             <a:pPr lvl="0"/>
             <a:r>
-              <a:rPr lang="zh-CN" altLang="en-US" smtClean="0"/>
+              <a:rPr lang="zh-CN" altLang="en-US"/>
               <a:t>单击此处编辑母版文本样式</a:t>
             </a:r>
-            <a:endParaRPr lang="zh-CN" altLang="en-US" smtClean="0"/>
           </a:p>
           <a:p>
             <a:pPr lvl="1"/>
             <a:r>
-              <a:rPr lang="zh-CN" altLang="en-US" smtClean="0"/>
+              <a:rPr lang="zh-CN" altLang="en-US"/>
               <a:t>第二级</a:t>
             </a:r>
-            <a:endParaRPr lang="zh-CN" altLang="en-US" smtClean="0"/>
           </a:p>
           <a:p>
             <a:pPr lvl="2"/>
             <a:r>
-              <a:rPr lang="zh-CN" altLang="en-US" smtClean="0"/>
+              <a:rPr lang="zh-CN" altLang="en-US"/>
               <a:t>第三级</a:t>
             </a:r>
-            <a:endParaRPr lang="zh-CN" altLang="en-US" smtClean="0"/>
           </a:p>
           <a:p>
             <a:pPr lvl="3"/>
             <a:r>
-              <a:rPr lang="zh-CN" altLang="en-US" smtClean="0"/>
+              <a:rPr lang="zh-CN" altLang="en-US"/>
               <a:t>第四级</a:t>
             </a:r>
-            <a:endParaRPr lang="zh-CN" altLang="en-US" smtClean="0"/>
           </a:p>
           <a:p>
             <a:pPr lvl="4"/>
             <a:r>
-              <a:rPr lang="zh-CN" altLang="en-US" smtClean="0"/>
+              <a:rPr lang="zh-CN" altLang="en-US"/>
               <a:t>第五级</a:t>
             </a:r>
-            <a:endParaRPr lang="zh-CN" altLang="en-US"/>
           </a:p>
         </p:txBody>
       </p:sp>
@@ -408,6 +407,7 @@
           <a:p>
             <a:fld id="{D997B5FA-0921-464F-AAE1-844C04324D75}" type="datetimeFigureOut">
               <a:rPr lang="zh-CN" altLang="en-US" smtClean="0"/>
+              <a:t>2023/1/12</a:t>
             </a:fld>
             <a:endParaRPr lang="zh-CN" altLang="en-US"/>
           </a:p>
@@ -449,6 +449,7 @@
           <a:p>
             <a:fld id="{565CE74E-AB26-4998-AD42-012C4C1AD076}" type="slidenum">
               <a:rPr lang="zh-CN" altLang="en-US" smtClean="0"/>
+              <a:t>‹#›</a:t>
             </a:fld>
             <a:endParaRPr lang="zh-CN" altLang="en-US"/>
           </a:p>
@@ -500,10 +501,9 @@
           <a:lstStyle/>
           <a:p>
             <a:r>
-              <a:rPr lang="zh-CN" altLang="en-US" smtClean="0"/>
+              <a:rPr lang="zh-CN" altLang="en-US"/>
               <a:t>单击此处编辑母版标题样式</a:t>
             </a:r>
-            <a:endParaRPr lang="zh-CN" altLang="en-US"/>
           </a:p>
         </p:txBody>
       </p:sp>
@@ -529,42 +529,37 @@
           <a:p>
             <a:pPr lvl="0"/>
             <a:r>
-              <a:rPr lang="zh-CN" altLang="en-US" smtClean="0"/>
+              <a:rPr lang="zh-CN" altLang="en-US"/>
               <a:t>单击此处编辑母版文本样式</a:t>
             </a:r>
-            <a:endParaRPr lang="zh-CN" altLang="en-US" smtClean="0"/>
           </a:p>
           <a:p>
             <a:pPr lvl="1"/>
             <a:r>
-              <a:rPr lang="zh-CN" altLang="en-US" smtClean="0"/>
+              <a:rPr lang="zh-CN" altLang="en-US"/>
               <a:t>第二级</a:t>
             </a:r>
-            <a:endParaRPr lang="zh-CN" altLang="en-US" smtClean="0"/>
           </a:p>
           <a:p>
             <a:pPr lvl="2"/>
             <a:r>
-              <a:rPr lang="zh-CN" altLang="en-US" smtClean="0"/>
+              <a:rPr lang="zh-CN" altLang="en-US"/>
               <a:t>第三级</a:t>
             </a:r>
-            <a:endParaRPr lang="zh-CN" altLang="en-US" smtClean="0"/>
           </a:p>
           <a:p>
             <a:pPr lvl="3"/>
             <a:r>
-              <a:rPr lang="zh-CN" altLang="en-US" smtClean="0"/>
+              <a:rPr lang="zh-CN" altLang="en-US"/>
               <a:t>第四级</a:t>
             </a:r>
-            <a:endParaRPr lang="zh-CN" altLang="en-US" smtClean="0"/>
           </a:p>
           <a:p>
             <a:pPr lvl="4"/>
             <a:r>
-              <a:rPr lang="zh-CN" altLang="en-US" smtClean="0"/>
+              <a:rPr lang="zh-CN" altLang="en-US"/>
               <a:t>第五级</a:t>
             </a:r>
-            <a:endParaRPr lang="zh-CN" altLang="en-US"/>
           </a:p>
         </p:txBody>
       </p:sp>
@@ -585,6 +580,7 @@
           <a:p>
             <a:fld id="{D997B5FA-0921-464F-AAE1-844C04324D75}" type="datetimeFigureOut">
               <a:rPr lang="zh-CN" altLang="en-US" smtClean="0"/>
+              <a:t>2023/1/12</a:t>
             </a:fld>
             <a:endParaRPr lang="zh-CN" altLang="en-US"/>
           </a:p>
@@ -626,6 +622,7 @@
           <a:p>
             <a:fld id="{565CE74E-AB26-4998-AD42-012C4C1AD076}" type="slidenum">
               <a:rPr lang="zh-CN" altLang="en-US" smtClean="0"/>
+              <a:t>‹#›</a:t>
             </a:fld>
             <a:endParaRPr lang="zh-CN" altLang="en-US"/>
           </a:p>
@@ -672,10 +669,9 @@
           <a:lstStyle/>
           <a:p>
             <a:r>
-              <a:rPr lang="zh-CN" altLang="en-US" smtClean="0"/>
+              <a:rPr lang="zh-CN" altLang="en-US"/>
               <a:t>单击此处编辑母版标题样式</a:t>
             </a:r>
-            <a:endParaRPr lang="zh-CN" altLang="en-US"/>
           </a:p>
         </p:txBody>
       </p:sp>
@@ -696,42 +692,37 @@
           <a:p>
             <a:pPr lvl="0"/>
             <a:r>
-              <a:rPr lang="zh-CN" altLang="en-US" smtClean="0"/>
+              <a:rPr lang="zh-CN" altLang="en-US"/>
               <a:t>单击此处编辑母版文本样式</a:t>
             </a:r>
-            <a:endParaRPr lang="zh-CN" altLang="en-US" smtClean="0"/>
           </a:p>
           <a:p>
             <a:pPr lvl="1"/>
             <a:r>
-              <a:rPr lang="zh-CN" altLang="en-US" smtClean="0"/>
+              <a:rPr lang="zh-CN" altLang="en-US"/>
               <a:t>第二级</a:t>
             </a:r>
-            <a:endParaRPr lang="zh-CN" altLang="en-US" smtClean="0"/>
           </a:p>
           <a:p>
             <a:pPr lvl="2"/>
             <a:r>
-              <a:rPr lang="zh-CN" altLang="en-US" smtClean="0"/>
+              <a:rPr lang="zh-CN" altLang="en-US"/>
               <a:t>第三级</a:t>
             </a:r>
-            <a:endParaRPr lang="zh-CN" altLang="en-US" smtClean="0"/>
           </a:p>
           <a:p>
             <a:pPr lvl="3"/>
             <a:r>
-              <a:rPr lang="zh-CN" altLang="en-US" smtClean="0"/>
+              <a:rPr lang="zh-CN" altLang="en-US"/>
               <a:t>第四级</a:t>
             </a:r>
-            <a:endParaRPr lang="zh-CN" altLang="en-US" smtClean="0"/>
           </a:p>
           <a:p>
             <a:pPr lvl="4"/>
             <a:r>
-              <a:rPr lang="zh-CN" altLang="en-US" smtClean="0"/>
+              <a:rPr lang="zh-CN" altLang="en-US"/>
               <a:t>第五级</a:t>
             </a:r>
-            <a:endParaRPr lang="zh-CN" altLang="en-US"/>
           </a:p>
         </p:txBody>
       </p:sp>
@@ -752,6 +743,7 @@
           <a:p>
             <a:fld id="{D997B5FA-0921-464F-AAE1-844C04324D75}" type="datetimeFigureOut">
               <a:rPr lang="zh-CN" altLang="en-US" smtClean="0"/>
+              <a:t>2023/1/12</a:t>
             </a:fld>
             <a:endParaRPr lang="zh-CN" altLang="en-US"/>
           </a:p>
@@ -793,6 +785,7 @@
           <a:p>
             <a:fld id="{565CE74E-AB26-4998-AD42-012C4C1AD076}" type="slidenum">
               <a:rPr lang="zh-CN" altLang="en-US" smtClean="0"/>
+              <a:t>‹#›</a:t>
             </a:fld>
             <a:endParaRPr lang="zh-CN" altLang="en-US"/>
           </a:p>
@@ -848,10 +841,9 @@
           </a:lstStyle>
           <a:p>
             <a:r>
-              <a:rPr lang="zh-CN" altLang="en-US" smtClean="0"/>
+              <a:rPr lang="zh-CN" altLang="en-US"/>
               <a:t>单击此处编辑母版标题样式</a:t>
             </a:r>
-            <a:endParaRPr lang="zh-CN" altLang="en-US"/>
           </a:p>
         </p:txBody>
       </p:sp>
@@ -968,10 +960,9 @@
           <a:p>
             <a:pPr lvl="0"/>
             <a:r>
-              <a:rPr lang="zh-CN" altLang="en-US" smtClean="0"/>
+              <a:rPr lang="zh-CN" altLang="en-US"/>
               <a:t>单击此处编辑母版文本样式</a:t>
             </a:r>
-            <a:endParaRPr lang="zh-CN" altLang="en-US" smtClean="0"/>
           </a:p>
         </p:txBody>
       </p:sp>
@@ -992,6 +983,7 @@
           <a:p>
             <a:fld id="{D997B5FA-0921-464F-AAE1-844C04324D75}" type="datetimeFigureOut">
               <a:rPr lang="zh-CN" altLang="en-US" smtClean="0"/>
+              <a:t>2023/1/12</a:t>
             </a:fld>
             <a:endParaRPr lang="zh-CN" altLang="en-US"/>
           </a:p>
@@ -1033,6 +1025,7 @@
           <a:p>
             <a:fld id="{565CE74E-AB26-4998-AD42-012C4C1AD076}" type="slidenum">
               <a:rPr lang="zh-CN" altLang="en-US" smtClean="0"/>
+              <a:t>‹#›</a:t>
             </a:fld>
             <a:endParaRPr lang="zh-CN" altLang="en-US"/>
           </a:p>
@@ -1079,10 +1072,9 @@
           <a:lstStyle/>
           <a:p>
             <a:r>
-              <a:rPr lang="zh-CN" altLang="en-US" smtClean="0"/>
+              <a:rPr lang="zh-CN" altLang="en-US"/>
               <a:t>单击此处编辑母版标题样式</a:t>
             </a:r>
-            <a:endParaRPr lang="zh-CN" altLang="en-US"/>
           </a:p>
         </p:txBody>
       </p:sp>
@@ -1108,42 +1100,37 @@
           <a:p>
             <a:pPr lvl="0"/>
             <a:r>
-              <a:rPr lang="zh-CN" altLang="en-US" smtClean="0"/>
+              <a:rPr lang="zh-CN" altLang="en-US"/>
               <a:t>单击此处编辑母版文本样式</a:t>
             </a:r>
-            <a:endParaRPr lang="zh-CN" altLang="en-US" smtClean="0"/>
           </a:p>
           <a:p>
             <a:pPr lvl="1"/>
             <a:r>
-              <a:rPr lang="zh-CN" altLang="en-US" smtClean="0"/>
+              <a:rPr lang="zh-CN" altLang="en-US"/>
               <a:t>第二级</a:t>
             </a:r>
-            <a:endParaRPr lang="zh-CN" altLang="en-US" smtClean="0"/>
           </a:p>
           <a:p>
             <a:pPr lvl="2"/>
             <a:r>
-              <a:rPr lang="zh-CN" altLang="en-US" smtClean="0"/>
+              <a:rPr lang="zh-CN" altLang="en-US"/>
               <a:t>第三级</a:t>
             </a:r>
-            <a:endParaRPr lang="zh-CN" altLang="en-US" smtClean="0"/>
           </a:p>
           <a:p>
             <a:pPr lvl="3"/>
             <a:r>
-              <a:rPr lang="zh-CN" altLang="en-US" smtClean="0"/>
+              <a:rPr lang="zh-CN" altLang="en-US"/>
               <a:t>第四级</a:t>
             </a:r>
-            <a:endParaRPr lang="zh-CN" altLang="en-US" smtClean="0"/>
           </a:p>
           <a:p>
             <a:pPr lvl="4"/>
             <a:r>
-              <a:rPr lang="zh-CN" altLang="en-US" smtClean="0"/>
+              <a:rPr lang="zh-CN" altLang="en-US"/>
               <a:t>第五级</a:t>
             </a:r>
-            <a:endParaRPr lang="zh-CN" altLang="en-US"/>
           </a:p>
         </p:txBody>
       </p:sp>
@@ -1169,42 +1156,37 @@
           <a:p>
             <a:pPr lvl="0"/>
             <a:r>
-              <a:rPr lang="zh-CN" altLang="en-US" smtClean="0"/>
+              <a:rPr lang="zh-CN" altLang="en-US"/>
               <a:t>单击此处编辑母版文本样式</a:t>
             </a:r>
-            <a:endParaRPr lang="zh-CN" altLang="en-US" smtClean="0"/>
           </a:p>
           <a:p>
             <a:pPr lvl="1"/>
             <a:r>
-              <a:rPr lang="zh-CN" altLang="en-US" smtClean="0"/>
+              <a:rPr lang="zh-CN" altLang="en-US"/>
               <a:t>第二级</a:t>
             </a:r>
-            <a:endParaRPr lang="zh-CN" altLang="en-US" smtClean="0"/>
           </a:p>
           <a:p>
             <a:pPr lvl="2"/>
             <a:r>
-              <a:rPr lang="zh-CN" altLang="en-US" smtClean="0"/>
+              <a:rPr lang="zh-CN" altLang="en-US"/>
               <a:t>第三级</a:t>
             </a:r>
-            <a:endParaRPr lang="zh-CN" altLang="en-US" smtClean="0"/>
           </a:p>
           <a:p>
             <a:pPr lvl="3"/>
             <a:r>
-              <a:rPr lang="zh-CN" altLang="en-US" smtClean="0"/>
+              <a:rPr lang="zh-CN" altLang="en-US"/>
               <a:t>第四级</a:t>
             </a:r>
-            <a:endParaRPr lang="zh-CN" altLang="en-US" smtClean="0"/>
           </a:p>
           <a:p>
             <a:pPr lvl="4"/>
             <a:r>
-              <a:rPr lang="zh-CN" altLang="en-US" smtClean="0"/>
+              <a:rPr lang="zh-CN" altLang="en-US"/>
               <a:t>第五级</a:t>
             </a:r>
-            <a:endParaRPr lang="zh-CN" altLang="en-US"/>
           </a:p>
         </p:txBody>
       </p:sp>
@@ -1225,6 +1207,7 @@
           <a:p>
             <a:fld id="{D997B5FA-0921-464F-AAE1-844C04324D75}" type="datetimeFigureOut">
               <a:rPr lang="zh-CN" altLang="en-US" smtClean="0"/>
+              <a:t>2023/1/12</a:t>
             </a:fld>
             <a:endParaRPr lang="zh-CN" altLang="en-US"/>
           </a:p>
@@ -1266,6 +1249,7 @@
           <a:p>
             <a:fld id="{565CE74E-AB26-4998-AD42-012C4C1AD076}" type="slidenum">
               <a:rPr lang="zh-CN" altLang="en-US" smtClean="0"/>
+              <a:t>‹#›</a:t>
             </a:fld>
             <a:endParaRPr lang="zh-CN" altLang="en-US"/>
           </a:p>
@@ -1317,10 +1301,9 @@
           <a:lstStyle/>
           <a:p>
             <a:r>
-              <a:rPr lang="zh-CN" altLang="en-US" smtClean="0"/>
+              <a:rPr lang="zh-CN" altLang="en-US"/>
               <a:t>单击此处编辑母版标题样式</a:t>
             </a:r>
-            <a:endParaRPr lang="zh-CN" altLang="en-US"/>
           </a:p>
         </p:txBody>
       </p:sp>
@@ -1383,10 +1366,9 @@
           <a:p>
             <a:pPr lvl="0"/>
             <a:r>
-              <a:rPr lang="zh-CN" altLang="en-US" smtClean="0"/>
+              <a:rPr lang="zh-CN" altLang="en-US"/>
               <a:t>单击此处编辑母版文本样式</a:t>
             </a:r>
-            <a:endParaRPr lang="zh-CN" altLang="en-US" smtClean="0"/>
           </a:p>
         </p:txBody>
       </p:sp>
@@ -1412,42 +1394,37 @@
           <a:p>
             <a:pPr lvl="0"/>
             <a:r>
-              <a:rPr lang="zh-CN" altLang="en-US" smtClean="0"/>
+              <a:rPr lang="zh-CN" altLang="en-US"/>
               <a:t>单击此处编辑母版文本样式</a:t>
             </a:r>
-            <a:endParaRPr lang="zh-CN" altLang="en-US" smtClean="0"/>
           </a:p>
           <a:p>
             <a:pPr lvl="1"/>
             <a:r>
-              <a:rPr lang="zh-CN" altLang="en-US" smtClean="0"/>
+              <a:rPr lang="zh-CN" altLang="en-US"/>
               <a:t>第二级</a:t>
             </a:r>
-            <a:endParaRPr lang="zh-CN" altLang="en-US" smtClean="0"/>
           </a:p>
           <a:p>
             <a:pPr lvl="2"/>
             <a:r>
-              <a:rPr lang="zh-CN" altLang="en-US" smtClean="0"/>
+              <a:rPr lang="zh-CN" altLang="en-US"/>
               <a:t>第三级</a:t>
             </a:r>
-            <a:endParaRPr lang="zh-CN" altLang="en-US" smtClean="0"/>
           </a:p>
           <a:p>
             <a:pPr lvl="3"/>
             <a:r>
-              <a:rPr lang="zh-CN" altLang="en-US" smtClean="0"/>
+              <a:rPr lang="zh-CN" altLang="en-US"/>
               <a:t>第四级</a:t>
             </a:r>
-            <a:endParaRPr lang="zh-CN" altLang="en-US" smtClean="0"/>
           </a:p>
           <a:p>
             <a:pPr lvl="4"/>
             <a:r>
-              <a:rPr lang="zh-CN" altLang="en-US" smtClean="0"/>
+              <a:rPr lang="zh-CN" altLang="en-US"/>
               <a:t>第五级</a:t>
             </a:r>
-            <a:endParaRPr lang="zh-CN" altLang="en-US"/>
           </a:p>
         </p:txBody>
       </p:sp>
@@ -1510,10 +1487,9 @@
           <a:p>
             <a:pPr lvl="0"/>
             <a:r>
-              <a:rPr lang="zh-CN" altLang="en-US" smtClean="0"/>
+              <a:rPr lang="zh-CN" altLang="en-US"/>
               <a:t>单击此处编辑母版文本样式</a:t>
             </a:r>
-            <a:endParaRPr lang="zh-CN" altLang="en-US" smtClean="0"/>
           </a:p>
         </p:txBody>
       </p:sp>
@@ -1539,42 +1515,37 @@
           <a:p>
             <a:pPr lvl="0"/>
             <a:r>
-              <a:rPr lang="zh-CN" altLang="en-US" smtClean="0"/>
+              <a:rPr lang="zh-CN" altLang="en-US"/>
               <a:t>单击此处编辑母版文本样式</a:t>
             </a:r>
-            <a:endParaRPr lang="zh-CN" altLang="en-US" smtClean="0"/>
           </a:p>
           <a:p>
             <a:pPr lvl="1"/>
             <a:r>
-              <a:rPr lang="zh-CN" altLang="en-US" smtClean="0"/>
+              <a:rPr lang="zh-CN" altLang="en-US"/>
               <a:t>第二级</a:t>
             </a:r>
-            <a:endParaRPr lang="zh-CN" altLang="en-US" smtClean="0"/>
           </a:p>
           <a:p>
             <a:pPr lvl="2"/>
             <a:r>
-              <a:rPr lang="zh-CN" altLang="en-US" smtClean="0"/>
+              <a:rPr lang="zh-CN" altLang="en-US"/>
               <a:t>第三级</a:t>
             </a:r>
-            <a:endParaRPr lang="zh-CN" altLang="en-US" smtClean="0"/>
           </a:p>
           <a:p>
             <a:pPr lvl="3"/>
             <a:r>
-              <a:rPr lang="zh-CN" altLang="en-US" smtClean="0"/>
+              <a:rPr lang="zh-CN" altLang="en-US"/>
               <a:t>第四级</a:t>
             </a:r>
-            <a:endParaRPr lang="zh-CN" altLang="en-US" smtClean="0"/>
           </a:p>
           <a:p>
             <a:pPr lvl="4"/>
             <a:r>
-              <a:rPr lang="zh-CN" altLang="en-US" smtClean="0"/>
+              <a:rPr lang="zh-CN" altLang="en-US"/>
               <a:t>第五级</a:t>
             </a:r>
-            <a:endParaRPr lang="zh-CN" altLang="en-US"/>
           </a:p>
         </p:txBody>
       </p:sp>
@@ -1595,6 +1566,7 @@
           <a:p>
             <a:fld id="{D997B5FA-0921-464F-AAE1-844C04324D75}" type="datetimeFigureOut">
               <a:rPr lang="zh-CN" altLang="en-US" smtClean="0"/>
+              <a:t>2023/1/12</a:t>
             </a:fld>
             <a:endParaRPr lang="zh-CN" altLang="en-US"/>
           </a:p>
@@ -1636,6 +1608,7 @@
           <a:p>
             <a:fld id="{565CE74E-AB26-4998-AD42-012C4C1AD076}" type="slidenum">
               <a:rPr lang="zh-CN" altLang="en-US" smtClean="0"/>
+              <a:t>‹#›</a:t>
             </a:fld>
             <a:endParaRPr lang="zh-CN" altLang="en-US"/>
           </a:p>
@@ -1682,10 +1655,9 @@
           <a:lstStyle/>
           <a:p>
             <a:r>
-              <a:rPr lang="zh-CN" altLang="en-US" smtClean="0"/>
+              <a:rPr lang="zh-CN" altLang="en-US"/>
               <a:t>单击此处编辑母版标题样式</a:t>
             </a:r>
-            <a:endParaRPr lang="zh-CN" altLang="en-US"/>
           </a:p>
         </p:txBody>
       </p:sp>
@@ -1706,6 +1678,7 @@
           <a:p>
             <a:fld id="{D997B5FA-0921-464F-AAE1-844C04324D75}" type="datetimeFigureOut">
               <a:rPr lang="zh-CN" altLang="en-US" smtClean="0"/>
+              <a:t>2023/1/12</a:t>
             </a:fld>
             <a:endParaRPr lang="zh-CN" altLang="en-US"/>
           </a:p>
@@ -1747,6 +1720,7 @@
           <a:p>
             <a:fld id="{565CE74E-AB26-4998-AD42-012C4C1AD076}" type="slidenum">
               <a:rPr lang="zh-CN" altLang="en-US" smtClean="0"/>
+              <a:t>‹#›</a:t>
             </a:fld>
             <a:endParaRPr lang="zh-CN" altLang="en-US"/>
           </a:p>
@@ -1794,6 +1768,7 @@
           <a:p>
             <a:fld id="{D997B5FA-0921-464F-AAE1-844C04324D75}" type="datetimeFigureOut">
               <a:rPr lang="zh-CN" altLang="en-US" smtClean="0"/>
+              <a:t>2023/1/12</a:t>
             </a:fld>
             <a:endParaRPr lang="zh-CN" altLang="en-US"/>
           </a:p>
@@ -1835,6 +1810,7 @@
           <a:p>
             <a:fld id="{565CE74E-AB26-4998-AD42-012C4C1AD076}" type="slidenum">
               <a:rPr lang="zh-CN" altLang="en-US" smtClean="0"/>
+              <a:t>‹#›</a:t>
             </a:fld>
             <a:endParaRPr lang="zh-CN" altLang="en-US"/>
           </a:p>
@@ -1890,10 +1866,9 @@
           </a:lstStyle>
           <a:p>
             <a:r>
-              <a:rPr lang="zh-CN" altLang="en-US" smtClean="0"/>
+              <a:rPr lang="zh-CN" altLang="en-US"/>
               <a:t>单击此处编辑母版标题样式</a:t>
             </a:r>
-            <a:endParaRPr lang="zh-CN" altLang="en-US"/>
           </a:p>
         </p:txBody>
       </p:sp>
@@ -1947,42 +1922,37 @@
           <a:p>
             <a:pPr lvl="0"/>
             <a:r>
-              <a:rPr lang="zh-CN" altLang="en-US" smtClean="0"/>
+              <a:rPr lang="zh-CN" altLang="en-US"/>
               <a:t>单击此处编辑母版文本样式</a:t>
             </a:r>
-            <a:endParaRPr lang="zh-CN" altLang="en-US" smtClean="0"/>
           </a:p>
           <a:p>
             <a:pPr lvl="1"/>
             <a:r>
-              <a:rPr lang="zh-CN" altLang="en-US" smtClean="0"/>
+              <a:rPr lang="zh-CN" altLang="en-US"/>
               <a:t>第二级</a:t>
             </a:r>
-            <a:endParaRPr lang="zh-CN" altLang="en-US" smtClean="0"/>
           </a:p>
           <a:p>
             <a:pPr lvl="2"/>
             <a:r>
-              <a:rPr lang="zh-CN" altLang="en-US" smtClean="0"/>
+              <a:rPr lang="zh-CN" altLang="en-US"/>
               <a:t>第三级</a:t>
             </a:r>
-            <a:endParaRPr lang="zh-CN" altLang="en-US" smtClean="0"/>
           </a:p>
           <a:p>
             <a:pPr lvl="3"/>
             <a:r>
-              <a:rPr lang="zh-CN" altLang="en-US" smtClean="0"/>
+              <a:rPr lang="zh-CN" altLang="en-US"/>
               <a:t>第四级</a:t>
             </a:r>
-            <a:endParaRPr lang="zh-CN" altLang="en-US" smtClean="0"/>
           </a:p>
           <a:p>
             <a:pPr lvl="4"/>
             <a:r>
-              <a:rPr lang="zh-CN" altLang="en-US" smtClean="0"/>
+              <a:rPr lang="zh-CN" altLang="en-US"/>
               <a:t>第五级</a:t>
             </a:r>
-            <a:endParaRPr lang="zh-CN" altLang="en-US"/>
           </a:p>
         </p:txBody>
       </p:sp>
@@ -2045,10 +2015,9 @@
           <a:p>
             <a:pPr lvl="0"/>
             <a:r>
-              <a:rPr lang="zh-CN" altLang="en-US" smtClean="0"/>
+              <a:rPr lang="zh-CN" altLang="en-US"/>
               <a:t>单击此处编辑母版文本样式</a:t>
             </a:r>
-            <a:endParaRPr lang="zh-CN" altLang="en-US" smtClean="0"/>
           </a:p>
         </p:txBody>
       </p:sp>
@@ -2069,6 +2038,7 @@
           <a:p>
             <a:fld id="{D997B5FA-0921-464F-AAE1-844C04324D75}" type="datetimeFigureOut">
               <a:rPr lang="zh-CN" altLang="en-US" smtClean="0"/>
+              <a:t>2023/1/12</a:t>
             </a:fld>
             <a:endParaRPr lang="zh-CN" altLang="en-US"/>
           </a:p>
@@ -2110,6 +2080,7 @@
           <a:p>
             <a:fld id="{565CE74E-AB26-4998-AD42-012C4C1AD076}" type="slidenum">
               <a:rPr lang="zh-CN" altLang="en-US" smtClean="0"/>
+              <a:t>‹#›</a:t>
             </a:fld>
             <a:endParaRPr lang="zh-CN" altLang="en-US"/>
           </a:p>
@@ -2165,10 +2136,9 @@
           </a:lstStyle>
           <a:p>
             <a:r>
-              <a:rPr lang="zh-CN" altLang="en-US" smtClean="0"/>
+              <a:rPr lang="zh-CN" altLang="en-US"/>
               <a:t>单击此处编辑母版标题样式</a:t>
             </a:r>
-            <a:endParaRPr lang="zh-CN" altLang="en-US"/>
           </a:p>
         </p:txBody>
       </p:sp>
@@ -2292,10 +2262,9 @@
           <a:p>
             <a:pPr lvl="0"/>
             <a:r>
-              <a:rPr lang="zh-CN" altLang="en-US" smtClean="0"/>
+              <a:rPr lang="zh-CN" altLang="en-US"/>
               <a:t>单击此处编辑母版文本样式</a:t>
             </a:r>
-            <a:endParaRPr lang="zh-CN" altLang="en-US" smtClean="0"/>
           </a:p>
         </p:txBody>
       </p:sp>
@@ -2316,6 +2285,7 @@
           <a:p>
             <a:fld id="{D997B5FA-0921-464F-AAE1-844C04324D75}" type="datetimeFigureOut">
               <a:rPr lang="zh-CN" altLang="en-US" smtClean="0"/>
+              <a:t>2023/1/12</a:t>
             </a:fld>
             <a:endParaRPr lang="zh-CN" altLang="en-US"/>
           </a:p>
@@ -2357,6 +2327,7 @@
           <a:p>
             <a:fld id="{565CE74E-AB26-4998-AD42-012C4C1AD076}" type="slidenum">
               <a:rPr lang="zh-CN" altLang="en-US" smtClean="0"/>
+              <a:t>‹#›</a:t>
             </a:fld>
             <a:endParaRPr lang="zh-CN" altLang="en-US"/>
           </a:p>
@@ -2418,10 +2389,9 @@
           <a:lstStyle/>
           <a:p>
             <a:r>
-              <a:rPr lang="zh-CN" altLang="en-US" smtClean="0"/>
+              <a:rPr lang="zh-CN" altLang="en-US"/>
               <a:t>单击此处编辑母版标题样式</a:t>
             </a:r>
-            <a:endParaRPr lang="zh-CN" altLang="en-US"/>
           </a:p>
         </p:txBody>
       </p:sp>
@@ -2452,42 +2422,37 @@
           <a:p>
             <a:pPr lvl="0"/>
             <a:r>
-              <a:rPr lang="zh-CN" altLang="en-US" smtClean="0"/>
+              <a:rPr lang="zh-CN" altLang="en-US"/>
               <a:t>单击此处编辑母版文本样式</a:t>
             </a:r>
-            <a:endParaRPr lang="zh-CN" altLang="en-US" smtClean="0"/>
           </a:p>
           <a:p>
             <a:pPr lvl="1"/>
             <a:r>
-              <a:rPr lang="zh-CN" altLang="en-US" smtClean="0"/>
+              <a:rPr lang="zh-CN" altLang="en-US"/>
               <a:t>第二级</a:t>
             </a:r>
-            <a:endParaRPr lang="zh-CN" altLang="en-US" smtClean="0"/>
           </a:p>
           <a:p>
             <a:pPr lvl="2"/>
             <a:r>
-              <a:rPr lang="zh-CN" altLang="en-US" smtClean="0"/>
+              <a:rPr lang="zh-CN" altLang="en-US"/>
               <a:t>第三级</a:t>
             </a:r>
-            <a:endParaRPr lang="zh-CN" altLang="en-US" smtClean="0"/>
           </a:p>
           <a:p>
             <a:pPr lvl="3"/>
             <a:r>
-              <a:rPr lang="zh-CN" altLang="en-US" smtClean="0"/>
+              <a:rPr lang="zh-CN" altLang="en-US"/>
               <a:t>第四级</a:t>
             </a:r>
-            <a:endParaRPr lang="zh-CN" altLang="en-US" smtClean="0"/>
           </a:p>
           <a:p>
             <a:pPr lvl="4"/>
             <a:r>
-              <a:rPr lang="zh-CN" altLang="en-US" smtClean="0"/>
+              <a:rPr lang="zh-CN" altLang="en-US"/>
               <a:t>第五级</a:t>
             </a:r>
-            <a:endParaRPr lang="zh-CN" altLang="en-US"/>
           </a:p>
         </p:txBody>
       </p:sp>
@@ -2526,6 +2491,7 @@
           <a:p>
             <a:fld id="{D997B5FA-0921-464F-AAE1-844C04324D75}" type="datetimeFigureOut">
               <a:rPr lang="zh-CN" altLang="en-US" smtClean="0"/>
+              <a:t>2023/1/12</a:t>
             </a:fld>
             <a:endParaRPr lang="zh-CN" altLang="en-US"/>
           </a:p>
@@ -2603,6 +2569,7 @@
           <a:p>
             <a:fld id="{565CE74E-AB26-4998-AD42-012C4C1AD076}" type="slidenum">
               <a:rPr lang="zh-CN" altLang="en-US" smtClean="0"/>
+              <a:t>‹#›</a:t>
             </a:fld>
             <a:endParaRPr lang="zh-CN" altLang="en-US"/>
           </a:p>
@@ -2916,7 +2883,14 @@
         <p:cNvGrpSpPr/>
         <p:nvPr/>
       </p:nvGrpSpPr>
-      <p:grpSpPr/>
+      <p:grpSpPr>
+        <a:xfrm>
+          <a:off x="0" y="0"/>
+          <a:ext cx="0" cy="0"/>
+          <a:chOff x="0" y="0"/>
+          <a:chExt cx="0" cy="0"/>
+        </a:xfrm>
+      </p:grpSpPr>
       <p:sp>
         <p:nvSpPr>
           <p:cNvPr id="2" name="矩形 1"/>
@@ -2960,21 +2934,17 @@
         </p:style>
         <p:txBody>
           <a:bodyPr rtlCol="0" anchor="ctr"/>
+          <a:lstStyle/>
           <a:p>
             <a:pPr algn="ctr"/>
             <a:r>
-              <a:rPr lang="en-US" altLang="zh-CN">
+              <a:rPr lang="en-US" altLang="zh-CN" dirty="0">
                 <a:solidFill>
                   <a:schemeClr val="tx1"/>
                 </a:solidFill>
               </a:rPr>
-              <a:t>Changing thread</a:t>
-            </a:r>
-            <a:endParaRPr lang="en-US" altLang="zh-CN">
-              <a:solidFill>
-                <a:schemeClr val="tx1"/>
-              </a:solidFill>
-            </a:endParaRPr>
+              <a:t>Rebuild thread</a:t>
+            </a:r>
           </a:p>
         </p:txBody>
       </p:sp>
@@ -3023,6 +2993,7 @@
         </p:style>
         <p:txBody>
           <a:bodyPr rtlCol="0" anchor="ctr"/>
+          <a:lstStyle/>
           <a:p>
             <a:pPr algn="ctr"/>
             <a:endParaRPr lang="en-US" altLang="zh-CN">
@@ -3078,6 +3049,7 @@
         </p:style>
         <p:txBody>
           <a:bodyPr rtlCol="0" anchor="ctr"/>
+          <a:lstStyle/>
           <a:p>
             <a:pPr algn="ctr"/>
             <a:endParaRPr lang="en-US" altLang="zh-CN">
@@ -3133,6 +3105,7 @@
         </p:style>
         <p:txBody>
           <a:bodyPr rtlCol="0" anchor="ctr"/>
+          <a:lstStyle/>
           <a:p>
             <a:pPr algn="ctr"/>
             <a:endParaRPr lang="en-US" altLang="zh-CN">
@@ -3151,8 +3124,8 @@
         </p:nvSpPr>
         <p:spPr>
           <a:xfrm>
-            <a:off x="176530" y="1028065"/>
-            <a:ext cx="1156970" cy="337185"/>
+            <a:off x="176529" y="1028065"/>
+            <a:ext cx="1357545" cy="338554"/>
           </a:xfrm>
           <a:prstGeom prst="rect">
             <a:avLst/>
@@ -3163,13 +3136,13 @@
           <a:bodyPr wrap="square" rtlCol="0">
             <a:spAutoFit/>
           </a:bodyPr>
+          <a:lstStyle/>
           <a:p>
             <a:pPr algn="ctr"/>
             <a:r>
-              <a:rPr lang="en-US" altLang="zh-CN" sz="1600"/>
-              <a:t>Shift start</a:t>
-            </a:r>
-            <a:endParaRPr lang="en-US" altLang="zh-CN" sz="1600"/>
+              <a:rPr lang="en-US" altLang="zh-CN" sz="1600" dirty="0"/>
+              <a:t>Rebuild starts</a:t>
+            </a:r>
           </a:p>
         </p:txBody>
       </p:sp>
@@ -3195,42 +3168,6 @@
             </a:solidFill>
             <a:prstDash val="solid"/>
             <a:tailEnd type="arrow"/>
-          </a:ln>
-        </p:spPr>
-        <p:style>
-          <a:lnRef idx="1">
-            <a:schemeClr val="accent1"/>
-          </a:lnRef>
-          <a:fillRef idx="0">
-            <a:schemeClr val="accent1"/>
-          </a:fillRef>
-          <a:effectRef idx="0">
-            <a:schemeClr val="accent1"/>
-          </a:effectRef>
-          <a:fontRef idx="minor">
-            <a:schemeClr val="tx1"/>
-          </a:fontRef>
-        </p:style>
-      </p:cxnSp>
-      <p:cxnSp>
-        <p:nvCxnSpPr>
-          <p:cNvPr id="36" name="直接连接符 35"/>
-          <p:cNvCxnSpPr/>
-          <p:nvPr/>
-        </p:nvCxnSpPr>
-        <p:spPr>
-          <a:xfrm>
-            <a:off x="241935" y="2480945"/>
-            <a:ext cx="6728460" cy="0"/>
-          </a:xfrm>
-          <a:prstGeom prst="line">
-            <a:avLst/>
-          </a:prstGeom>
-          <a:ln w="15875" cmpd="sng">
-            <a:solidFill>
-              <a:schemeClr val="tx1"/>
-            </a:solidFill>
-            <a:prstDash val="dash"/>
           </a:ln>
         </p:spPr>
         <p:style>
@@ -3291,23 +3228,36 @@
         </p:style>
         <p:txBody>
           <a:bodyPr rtlCol="0" anchor="ctr"/>
+          <a:lstStyle/>
           <a:p>
             <a:pPr algn="ctr"/>
             <a:r>
-              <a:rPr lang="en-US" altLang="zh-CN">
+              <a:rPr lang="en-US" altLang="zh-CN" dirty="0">
                 <a:solidFill>
                   <a:schemeClr val="tx1"/>
                 </a:solidFill>
                 <a:sym typeface="+mn-ea"/>
               </a:rPr>
-              <a:t>Set status “Changing”</a:t>
-            </a:r>
-            <a:endParaRPr lang="en-US" altLang="zh-CN">
-              <a:solidFill>
-                <a:schemeClr val="tx1"/>
-              </a:solidFill>
-              <a:sym typeface="+mn-ea"/>
-            </a:endParaRPr>
+              <a:t>Set status</a:t>
+            </a:r>
+            <a:r>
+              <a:rPr lang="zh-CN" altLang="en-US" dirty="0">
+                <a:solidFill>
+                  <a:schemeClr val="tx1"/>
+                </a:solidFill>
+                <a:sym typeface="+mn-ea"/>
+              </a:rPr>
+              <a:t> </a:t>
+            </a:r>
+            <a:r>
+              <a:rPr lang="en-US" altLang="zh-CN" dirty="0">
+                <a:solidFill>
+                  <a:schemeClr val="tx1"/>
+                </a:solidFill>
+                <a:sym typeface="+mn-ea"/>
+              </a:rPr>
+              <a:t>to Rebuilding</a:t>
+            </a:r>
           </a:p>
         </p:txBody>
       </p:sp>
@@ -3358,6 +3308,7 @@
         </p:style>
         <p:txBody>
           <a:bodyPr rtlCol="0" anchor="ctr"/>
+          <a:lstStyle/>
           <a:p>
             <a:pPr algn="ctr"/>
             <a:r>
@@ -3369,12 +3320,6 @@
               </a:rPr>
               <a:t>Create new HAM</a:t>
             </a:r>
-            <a:endParaRPr lang="en-US" altLang="zh-CN">
-              <a:solidFill>
-                <a:schemeClr val="tx1"/>
-              </a:solidFill>
-              <a:sym typeface="+mn-ea"/>
-            </a:endParaRPr>
           </a:p>
         </p:txBody>
       </p:sp>
@@ -3425,23 +3370,18 @@
         </p:style>
         <p:txBody>
           <a:bodyPr rtlCol="0" anchor="ctr"/>
+          <a:lstStyle/>
           <a:p>
             <a:pPr algn="ctr"/>
             <a:r>
-              <a:rPr lang="en-US" altLang="zh-CN">
+              <a:rPr lang="en-US" altLang="zh-CN" dirty="0">
                 <a:solidFill>
                   <a:schemeClr val="tx1"/>
                 </a:solidFill>
                 <a:sym typeface="+mn-ea"/>
               </a:rPr>
-              <a:t>Set status “ChangeDone”</a:t>
-            </a:r>
-            <a:endParaRPr lang="en-US" altLang="zh-CN">
-              <a:solidFill>
-                <a:schemeClr val="tx1"/>
-              </a:solidFill>
-              <a:sym typeface="+mn-ea"/>
-            </a:endParaRPr>
+              <a:t>Clear Rebuilding status</a:t>
+            </a:r>
           </a:p>
         </p:txBody>
       </p:sp>
@@ -3453,7 +3393,7 @@
         </p:nvSpPr>
         <p:spPr>
           <a:xfrm>
-            <a:off x="4622800" y="4584700"/>
+            <a:off x="4622800" y="3995361"/>
             <a:ext cx="1562100" cy="1071880"/>
           </a:xfrm>
           <a:prstGeom prst="diamond">
@@ -3486,17 +3426,10 @@
         </p:style>
         <p:txBody>
           <a:bodyPr rtlCol="0" anchor="ctr"/>
+          <a:lstStyle/>
           <a:p>
             <a:pPr algn="ctr"/>
-            <a:r>
-              <a:rPr lang="en-US" altLang="zh-CN" sz="1600">
-                <a:solidFill>
-                  <a:schemeClr val="tx1"/>
-                </a:solidFill>
-              </a:rPr>
-              <a:t>Belong to old HAM</a:t>
-            </a:r>
-            <a:endParaRPr lang="en-US" altLang="zh-CN" sz="1600">
+            <a:endParaRPr lang="en-US" altLang="zh-CN" sz="1600" dirty="0">
               <a:solidFill>
                 <a:schemeClr val="tx1"/>
               </a:solidFill>
@@ -3517,7 +3450,7 @@
         <p:spPr>
           <a:xfrm>
             <a:off x="471805" y="8148320"/>
-            <a:ext cx="2934335" cy="675640"/>
+            <a:ext cx="4530945" cy="675640"/>
           </a:xfrm>
           <a:prstGeom prst="rect">
             <a:avLst/>
@@ -3551,45 +3484,55 @@
         </p:style>
         <p:txBody>
           <a:bodyPr rtlCol="0" anchor="ctr"/>
+          <a:lstStyle/>
           <a:p>
             <a:pPr algn="ctr"/>
             <a:r>
-              <a:rPr lang="en-US" altLang="zh-CN">
+              <a:rPr lang="en-US" altLang="zh-CN" dirty="0">
                 <a:solidFill>
                   <a:schemeClr val="tx1"/>
                 </a:solidFill>
                 <a:sym typeface="+mn-ea"/>
               </a:rPr>
-              <a:t>Replace HAM</a:t>
-            </a:r>
-            <a:r>
-              <a:rPr lang="en-US" altLang="zh-CN" baseline="-25000">
+              <a:t>Replace old</a:t>
+            </a:r>
+            <a:r>
+              <a:rPr lang="zh-CN" altLang="en-US" dirty="0">
                 <a:solidFill>
                   <a:schemeClr val="tx1"/>
                 </a:solidFill>
                 <a:sym typeface="+mn-ea"/>
               </a:rPr>
-              <a:t>old</a:t>
-            </a:r>
-            <a:r>
-              <a:rPr lang="en-US" altLang="zh-CN">
+              <a:t> </a:t>
+            </a:r>
+            <a:r>
+              <a:rPr lang="en-US" altLang="zh-CN" dirty="0">
                 <a:solidFill>
                   <a:schemeClr val="tx1"/>
                 </a:solidFill>
                 <a:sym typeface="+mn-ea"/>
               </a:rPr>
-              <a:t> with HAM</a:t>
-            </a:r>
-            <a:r>
-              <a:rPr lang="en-US" altLang="zh-CN" baseline="-25000">
+              <a:t>HAM with new</a:t>
+            </a:r>
+            <a:r>
+              <a:rPr lang="zh-CN" altLang="en-US" dirty="0">
                 <a:solidFill>
                   <a:schemeClr val="tx1"/>
                 </a:solidFill>
                 <a:sym typeface="+mn-ea"/>
               </a:rPr>
-              <a:t>new</a:t>
-            </a:r>
-            <a:endParaRPr lang="en-US" altLang="zh-CN" baseline="-25000">
+              <a:t> </a:t>
+            </a:r>
+            <a:r>
+              <a:rPr lang="en-US" altLang="zh-CN" dirty="0">
+                <a:solidFill>
+                  <a:schemeClr val="tx1"/>
+                </a:solidFill>
+                <a:sym typeface="+mn-ea"/>
+              </a:rPr>
+              <a:t>HAM</a:t>
+            </a:r>
+            <a:endParaRPr lang="en-US" altLang="zh-CN" baseline="-25000" dirty="0">
               <a:solidFill>
                 <a:schemeClr val="tx1"/>
               </a:solidFill>
@@ -3610,7 +3553,7 @@
         </p:nvSpPr>
         <p:spPr>
           <a:xfrm>
-            <a:off x="4295140" y="3633470"/>
+            <a:off x="4295140" y="2711131"/>
             <a:ext cx="2216785" cy="705485"/>
           </a:xfrm>
           <a:prstGeom prst="rect">
@@ -3643,21 +3586,17 @@
         </p:style>
         <p:txBody>
           <a:bodyPr rtlCol="0" anchor="ctr"/>
+          <a:lstStyle/>
           <a:p>
             <a:pPr algn="ctr"/>
             <a:r>
-              <a:rPr lang="en-US" altLang="zh-CN">
+              <a:rPr lang="en-US" altLang="zh-CN" dirty="0">
                 <a:solidFill>
                   <a:schemeClr val="tx1"/>
                 </a:solidFill>
               </a:rPr>
-              <a:t>Update index directly</a:t>
-            </a:r>
-            <a:endParaRPr lang="en-US" altLang="zh-CN">
-              <a:solidFill>
-                <a:schemeClr val="tx1"/>
-              </a:solidFill>
-            </a:endParaRPr>
+              <a:t>Update Index</a:t>
+            </a:r>
           </a:p>
         </p:txBody>
       </p:sp>
@@ -3673,8 +3612,8 @@
         </p:nvSpPr>
         <p:spPr>
           <a:xfrm>
-            <a:off x="3836035" y="6557010"/>
-            <a:ext cx="1362710" cy="975995"/>
+            <a:off x="3836035" y="6366794"/>
+            <a:ext cx="1362710" cy="1166211"/>
           </a:xfrm>
           <a:prstGeom prst="rect">
             <a:avLst/>
@@ -3706,41 +3645,141 @@
         </p:style>
         <p:txBody>
           <a:bodyPr rtlCol="0" anchor="ctr"/>
+          <a:lstStyle/>
           <a:p>
             <a:pPr algn="ctr"/>
             <a:r>
-              <a:rPr lang="en-US" altLang="zh-CN" sz="1600">
+              <a:rPr lang="en-US" altLang="zh-CN" sz="1600" dirty="0">
                 <a:solidFill>
                   <a:schemeClr val="tx1"/>
                 </a:solidFill>
               </a:rPr>
-              <a:t>Mark Valid false and</a:t>
-            </a:r>
-            <a:endParaRPr lang="en-US" altLang="zh-CN" sz="1600">
-              <a:solidFill>
-                <a:schemeClr val="tx1"/>
-              </a:solidFill>
-            </a:endParaRPr>
-          </a:p>
-          <a:p>
-            <a:pPr algn="ctr"/>
-            <a:r>
-              <a:rPr lang="en-US" altLang="zh-CN" sz="1600">
+              <a:t>Set</a:t>
+            </a:r>
+            <a:r>
+              <a:rPr lang="zh-CN" altLang="en-US" sz="1600" dirty="0">
                 <a:solidFill>
                   <a:schemeClr val="tx1"/>
                 </a:solidFill>
               </a:rPr>
-              <a:t>get Address from HAM</a:t>
-            </a:r>
-            <a:r>
-              <a:rPr lang="en-US" altLang="zh-CN" sz="1600" baseline="-25000">
+              <a:t> </a:t>
+            </a:r>
+            <a:r>
+              <a:rPr lang="en-US" altLang="zh-CN" sz="1600" dirty="0">
+                <a:solidFill>
+                  <a:schemeClr val="tx1"/>
+                </a:solidFill>
+              </a:rPr>
+              <a:t>Flushed</a:t>
+            </a:r>
+            <a:r>
+              <a:rPr lang="zh-CN" altLang="en-US" sz="1600" dirty="0">
+                <a:solidFill>
+                  <a:schemeClr val="tx1"/>
+                </a:solidFill>
+              </a:rPr>
+              <a:t> </a:t>
+            </a:r>
+            <a:r>
+              <a:rPr lang="en-US" altLang="zh-CN" sz="1600" dirty="0">
+                <a:solidFill>
+                  <a:schemeClr val="tx1"/>
+                </a:solidFill>
+              </a:rPr>
+              <a:t>to</a:t>
+            </a:r>
+            <a:r>
+              <a:rPr lang="zh-CN" altLang="en-US" sz="1600" dirty="0">
+                <a:solidFill>
+                  <a:schemeClr val="tx1"/>
+                </a:solidFill>
+              </a:rPr>
+              <a:t> </a:t>
+            </a:r>
+            <a:r>
+              <a:rPr lang="en-US" altLang="zh-CN" sz="1600" dirty="0">
+                <a:solidFill>
+                  <a:schemeClr val="tx1"/>
+                </a:solidFill>
+              </a:rPr>
+              <a:t>True</a:t>
+            </a:r>
+            <a:r>
+              <a:rPr lang="zh-CN" altLang="en-US" sz="1600" dirty="0">
+                <a:solidFill>
+                  <a:schemeClr val="tx1"/>
+                </a:solidFill>
+              </a:rPr>
+              <a:t> </a:t>
+            </a:r>
+            <a:r>
+              <a:rPr lang="en-US" altLang="zh-CN" sz="1600" dirty="0">
+                <a:solidFill>
+                  <a:schemeClr val="tx1"/>
+                </a:solidFill>
+              </a:rPr>
+              <a:t>and</a:t>
+            </a:r>
+          </a:p>
+          <a:p>
+            <a:pPr algn="ctr"/>
+            <a:r>
+              <a:rPr lang="en-US" altLang="zh-CN" sz="1600" dirty="0">
+                <a:solidFill>
+                  <a:schemeClr val="tx1"/>
+                </a:solidFill>
+              </a:rPr>
+              <a:t>get Address</a:t>
+            </a:r>
+            <a:r>
+              <a:rPr lang="zh-CN" altLang="en-US" sz="1600" dirty="0">
+                <a:solidFill>
+                  <a:schemeClr val="tx1"/>
+                </a:solidFill>
+              </a:rPr>
+              <a:t> </a:t>
+            </a:r>
+            <a:r>
+              <a:rPr lang="en-US" altLang="zh-CN" sz="1600" dirty="0">
+                <a:solidFill>
+                  <a:schemeClr val="tx1"/>
+                </a:solidFill>
+              </a:rPr>
+              <a:t>from</a:t>
+            </a:r>
+            <a:r>
+              <a:rPr lang="zh-CN" altLang="en-US" sz="1600" dirty="0">
+                <a:solidFill>
+                  <a:schemeClr val="tx1"/>
+                </a:solidFill>
+              </a:rPr>
+              <a:t> </a:t>
+            </a:r>
+            <a:r>
+              <a:rPr lang="en-US" altLang="zh-CN" sz="1600" dirty="0">
                 <a:solidFill>
                   <a:schemeClr val="tx1"/>
                 </a:solidFill>
               </a:rPr>
               <a:t>old</a:t>
             </a:r>
-            <a:endParaRPr lang="en-US" altLang="zh-CN" sz="1600" baseline="-25000">
+            <a:r>
+              <a:rPr lang="zh-CN" altLang="en-US" sz="1600" dirty="0">
+                <a:solidFill>
+                  <a:schemeClr val="tx1"/>
+                </a:solidFill>
+              </a:rPr>
+              <a:t> </a:t>
+            </a:r>
+            <a:r>
+              <a:rPr lang="en-US" altLang="zh-CN" sz="1600" dirty="0">
+                <a:solidFill>
+                  <a:schemeClr val="tx1"/>
+                </a:solidFill>
+              </a:rPr>
+              <a:t>HAM</a:t>
+            </a:r>
+            <a:endParaRPr lang="en-US" altLang="zh-CN" sz="1600" baseline="-25000" dirty="0">
               <a:solidFill>
                 <a:schemeClr val="tx1"/>
               </a:solidFill>
@@ -3750,7 +3789,7 @@
       </p:sp>
       <p:sp>
         <p:nvSpPr>
-          <p:cNvPr id="53" name="矩形 52"/>
+          <p:cNvPr id="41" name="矩形 40"/>
           <p:cNvSpPr/>
           <p:nvPr>
             <p:custDataLst>
@@ -3760,8 +3799,8 @@
         </p:nvSpPr>
         <p:spPr>
           <a:xfrm>
-            <a:off x="3910965" y="8129270"/>
-            <a:ext cx="2789555" cy="676275"/>
+            <a:off x="471805" y="3633470"/>
+            <a:ext cx="2692400" cy="2921635"/>
           </a:xfrm>
           <a:prstGeom prst="rect">
             <a:avLst/>
@@ -3795,73 +3834,7 @@
         </p:style>
         <p:txBody>
           <a:bodyPr rtlCol="0" anchor="ctr"/>
-          <a:p>
-            <a:pPr algn="ctr"/>
-            <a:r>
-              <a:rPr lang="en-US" altLang="zh-CN" sz="2000">
-                <a:solidFill>
-                  <a:schemeClr val="tx1"/>
-                </a:solidFill>
-                <a:sym typeface="+mn-ea"/>
-              </a:rPr>
-              <a:t>Set status “NotChanging”</a:t>
-            </a:r>
-            <a:endParaRPr lang="en-US" altLang="zh-CN" sz="2000" baseline="-25000">
-              <a:solidFill>
-                <a:schemeClr val="tx1"/>
-              </a:solidFill>
-              <a:sym typeface="+mn-ea"/>
-            </a:endParaRPr>
-          </a:p>
-        </p:txBody>
-      </p:sp>
-      <p:sp>
-        <p:nvSpPr>
-          <p:cNvPr id="41" name="矩形 40"/>
-          <p:cNvSpPr/>
-          <p:nvPr>
-            <p:custDataLst>
-              <p:tags r:id="rId10"/>
-            </p:custDataLst>
-          </p:nvPr>
-        </p:nvSpPr>
-        <p:spPr>
-          <a:xfrm>
-            <a:off x="471805" y="3633470"/>
-            <a:ext cx="2692400" cy="2921635"/>
-          </a:xfrm>
-          <a:prstGeom prst="rect">
-            <a:avLst/>
-          </a:prstGeom>
-          <a:solidFill>
-            <a:schemeClr val="bg1">
-              <a:lumMod val="85000"/>
-            </a:schemeClr>
-          </a:solidFill>
-          <a:ln>
-            <a:solidFill>
-              <a:schemeClr val="tx1"/>
-            </a:solidFill>
-          </a:ln>
-        </p:spPr>
-        <p:style>
-          <a:lnRef idx="2">
-            <a:schemeClr val="accent1">
-              <a:shade val="50000"/>
-            </a:schemeClr>
-          </a:lnRef>
-          <a:fillRef idx="1">
-            <a:schemeClr val="accent1"/>
-          </a:fillRef>
-          <a:effectRef idx="0">
-            <a:schemeClr val="accent1"/>
-          </a:effectRef>
-          <a:fontRef idx="minor">
-            <a:schemeClr val="lt1"/>
-          </a:fontRef>
-        </p:style>
-        <p:txBody>
-          <a:bodyPr rtlCol="0" anchor="ctr"/>
+          <a:lstStyle/>
           <a:p>
             <a:pPr algn="ctr">
               <a:lnSpc>
@@ -3896,6 +3869,7 @@
           <a:bodyPr wrap="square" rtlCol="0" anchor="t">
             <a:spAutoFit/>
           </a:bodyPr>
+          <a:lstStyle/>
           <a:p>
             <a:pPr algn="ctr">
               <a:lnSpc>
@@ -3911,12 +3885,6 @@
               </a:rPr>
               <a:t>Traverse old HAM</a:t>
             </a:r>
-            <a:endParaRPr lang="en-US" altLang="zh-CN">
-              <a:solidFill>
-                <a:schemeClr val="tx1"/>
-              </a:solidFill>
-              <a:sym typeface="+mn-ea"/>
-            </a:endParaRPr>
           </a:p>
         </p:txBody>
       </p:sp>
@@ -3926,7 +3894,7 @@
           <p:cNvSpPr/>
           <p:nvPr>
             <p:custDataLst>
-              <p:tags r:id="rId11"/>
+              <p:tags r:id="rId10"/>
             </p:custDataLst>
           </p:nvPr>
         </p:nvSpPr>
@@ -3967,21 +3935,17 @@
         </p:style>
         <p:txBody>
           <a:bodyPr rtlCol="0" anchor="ctr"/>
+          <a:lstStyle/>
           <a:p>
             <a:pPr algn="ctr"/>
             <a:r>
-              <a:rPr lang="en-US" altLang="zh-CN">
+              <a:rPr lang="en-US" altLang="zh-CN" dirty="0">
                 <a:solidFill>
                   <a:schemeClr val="tx1"/>
                 </a:solidFill>
               </a:rPr>
-              <a:t>Check Valid</a:t>
-            </a:r>
-            <a:endParaRPr lang="en-US" altLang="zh-CN">
-              <a:solidFill>
-                <a:schemeClr val="tx1"/>
-              </a:solidFill>
-            </a:endParaRPr>
+              <a:t>Check Flushed</a:t>
+            </a:r>
           </a:p>
         </p:txBody>
       </p:sp>
@@ -3991,7 +3955,7 @@
           <p:cNvSpPr/>
           <p:nvPr>
             <p:custDataLst>
-              <p:tags r:id="rId12"/>
+              <p:tags r:id="rId11"/>
             </p:custDataLst>
           </p:nvPr>
         </p:nvSpPr>
@@ -4032,21 +3996,65 @@
         </p:style>
         <p:txBody>
           <a:bodyPr rtlCol="0" anchor="ctr"/>
+          <a:lstStyle/>
           <a:p>
             <a:pPr algn="ctr"/>
             <a:r>
-              <a:rPr lang="en-US" altLang="zh-CN">
+              <a:rPr lang="en-US" altLang="zh-CN" dirty="0">
                 <a:solidFill>
                   <a:schemeClr val="tx1"/>
                 </a:solidFill>
               </a:rPr>
-              <a:t>Mark “false”</a:t>
-            </a:r>
-            <a:endParaRPr lang="en-US" altLang="zh-CN">
-              <a:solidFill>
-                <a:schemeClr val="tx1"/>
-              </a:solidFill>
-            </a:endParaRPr>
+              <a:t>Set</a:t>
+            </a:r>
+            <a:r>
+              <a:rPr lang="zh-CN" altLang="en-US" dirty="0">
+                <a:solidFill>
+                  <a:schemeClr val="tx1"/>
+                </a:solidFill>
+              </a:rPr>
+              <a:t> </a:t>
+            </a:r>
+            <a:r>
+              <a:rPr lang="en-US" altLang="zh-CN" dirty="0">
+                <a:solidFill>
+                  <a:schemeClr val="tx1"/>
+                </a:solidFill>
+              </a:rPr>
+              <a:t>Flushed</a:t>
+            </a:r>
+            <a:r>
+              <a:rPr lang="zh-CN" altLang="en-US" dirty="0">
+                <a:solidFill>
+                  <a:schemeClr val="tx1"/>
+                </a:solidFill>
+              </a:rPr>
+              <a:t> </a:t>
+            </a:r>
+            <a:r>
+              <a:rPr lang="en-US" altLang="zh-CN" dirty="0">
+                <a:solidFill>
+                  <a:schemeClr val="tx1"/>
+                </a:solidFill>
+              </a:rPr>
+              <a:t>to</a:t>
+            </a:r>
+            <a:r>
+              <a:rPr lang="zh-CN" altLang="en-US" dirty="0">
+                <a:solidFill>
+                  <a:schemeClr val="tx1"/>
+                </a:solidFill>
+              </a:rPr>
+              <a:t> </a:t>
+            </a:r>
+            <a:r>
+              <a:rPr lang="en-US" altLang="zh-CN" dirty="0">
+                <a:solidFill>
+                  <a:schemeClr val="tx1"/>
+                </a:solidFill>
+              </a:rPr>
+              <a:t>True</a:t>
+            </a:r>
           </a:p>
         </p:txBody>
       </p:sp>
@@ -4056,7 +4064,7 @@
           <p:cNvSpPr/>
           <p:nvPr>
             <p:custDataLst>
-              <p:tags r:id="rId13"/>
+              <p:tags r:id="rId12"/>
             </p:custDataLst>
           </p:nvPr>
         </p:nvSpPr>
@@ -4097,71 +4105,27 @@
         </p:style>
         <p:txBody>
           <a:bodyPr rtlCol="0" anchor="ctr"/>
+          <a:lstStyle/>
           <a:p>
             <a:pPr algn="ctr"/>
             <a:r>
-              <a:rPr lang="en-US" altLang="zh-CN">
+              <a:rPr lang="en-US" altLang="zh-CN" dirty="0">
                 <a:solidFill>
                   <a:schemeClr val="tx1"/>
                 </a:solidFill>
               </a:rPr>
-              <a:t>update Index</a:t>
-            </a:r>
-            <a:endParaRPr lang="en-US" altLang="zh-CN">
-              <a:solidFill>
-                <a:schemeClr val="tx1"/>
-              </a:solidFill>
-            </a:endParaRPr>
-          </a:p>
-        </p:txBody>
-      </p:sp>
-      <p:cxnSp>
-        <p:nvCxnSpPr>
-          <p:cNvPr id="60" name="直接连接符 59"/>
-          <p:cNvCxnSpPr/>
-          <p:nvPr>
-            <p:custDataLst>
-              <p:tags r:id="rId14"/>
-            </p:custDataLst>
-          </p:nvPr>
-        </p:nvCxnSpPr>
-        <p:spPr>
-          <a:xfrm>
-            <a:off x="290195" y="7917815"/>
-            <a:ext cx="6690360" cy="0"/>
-          </a:xfrm>
-          <a:prstGeom prst="line">
-            <a:avLst/>
-          </a:prstGeom>
-          <a:ln w="15875" cmpd="sng">
-            <a:solidFill>
-              <a:schemeClr val="tx1"/>
-            </a:solidFill>
-            <a:prstDash val="dash"/>
-          </a:ln>
-        </p:spPr>
-        <p:style>
-          <a:lnRef idx="1">
-            <a:schemeClr val="accent1"/>
-          </a:lnRef>
-          <a:fillRef idx="0">
-            <a:schemeClr val="accent1"/>
-          </a:fillRef>
-          <a:effectRef idx="0">
-            <a:schemeClr val="accent1"/>
-          </a:effectRef>
-          <a:fontRef idx="minor">
-            <a:schemeClr val="tx1"/>
-          </a:fontRef>
-        </p:style>
-      </p:cxnSp>
+              <a:t>Update Index</a:t>
+            </a:r>
+          </a:p>
+        </p:txBody>
+      </p:sp>
       <p:cxnSp>
         <p:nvCxnSpPr>
           <p:cNvPr id="68" name="直接箭头连接符 67"/>
           <p:cNvCxnSpPr/>
           <p:nvPr>
             <p:custDataLst>
-              <p:tags r:id="rId15"/>
+              <p:tags r:id="rId13"/>
             </p:custDataLst>
           </p:nvPr>
         </p:nvCxnSpPr>
@@ -4204,7 +4168,7 @@
           </p:cNvCxnSpPr>
           <p:nvPr>
             <p:custDataLst>
-              <p:tags r:id="rId16"/>
+              <p:tags r:id="rId14"/>
             </p:custDataLst>
           </p:nvPr>
         </p:nvCxnSpPr>
@@ -4245,7 +4209,7 @@
           <p:cNvCxnSpPr/>
           <p:nvPr>
             <p:custDataLst>
-              <p:tags r:id="rId17"/>
+              <p:tags r:id="rId15"/>
             </p:custDataLst>
           </p:nvPr>
         </p:nvCxnSpPr>
@@ -4286,7 +4250,7 @@
           <p:cNvCxnSpPr/>
           <p:nvPr>
             <p:custDataLst>
-              <p:tags r:id="rId18"/>
+              <p:tags r:id="rId16"/>
             </p:custDataLst>
           </p:nvPr>
         </p:nvCxnSpPr>
@@ -4327,7 +4291,7 @@
           <p:cNvCxnSpPr/>
           <p:nvPr>
             <p:custDataLst>
-              <p:tags r:id="rId19"/>
+              <p:tags r:id="rId17"/>
             </p:custDataLst>
           </p:nvPr>
         </p:nvCxnSpPr>
@@ -4364,52 +4328,11 @@
       </p:cxnSp>
       <p:cxnSp>
         <p:nvCxnSpPr>
-          <p:cNvPr id="74" name="直接箭头连接符 73"/>
-          <p:cNvCxnSpPr/>
-          <p:nvPr>
-            <p:custDataLst>
-              <p:tags r:id="rId20"/>
-            </p:custDataLst>
-          </p:nvPr>
-        </p:nvCxnSpPr>
-        <p:spPr>
-          <a:xfrm flipV="1">
-            <a:off x="3406140" y="8479155"/>
-            <a:ext cx="480060" cy="6985"/>
-          </a:xfrm>
-          <a:prstGeom prst="straightConnector1">
-            <a:avLst/>
-          </a:prstGeom>
-          <a:ln w="34925" cmpd="sng">
-            <a:solidFill>
-              <a:schemeClr val="tx1"/>
-            </a:solidFill>
-            <a:prstDash val="solid"/>
-            <a:tailEnd type="arrow"/>
-          </a:ln>
-        </p:spPr>
-        <p:style>
-          <a:lnRef idx="1">
-            <a:schemeClr val="accent1"/>
-          </a:lnRef>
-          <a:fillRef idx="0">
-            <a:schemeClr val="accent1"/>
-          </a:fillRef>
-          <a:effectRef idx="0">
-            <a:schemeClr val="accent1"/>
-          </a:effectRef>
-          <a:fontRef idx="minor">
-            <a:schemeClr val="tx1"/>
-          </a:fontRef>
-        </p:style>
-      </p:cxnSp>
-      <p:cxnSp>
-        <p:nvCxnSpPr>
           <p:cNvPr id="75" name="直接箭头连接符 74"/>
           <p:cNvCxnSpPr/>
           <p:nvPr>
             <p:custDataLst>
-              <p:tags r:id="rId21"/>
+              <p:tags r:id="rId18"/>
             </p:custDataLst>
           </p:nvPr>
         </p:nvCxnSpPr>
@@ -4450,17 +4373,19 @@
       <p:cxnSp>
         <p:nvCxnSpPr>
           <p:cNvPr id="77" name="直接箭头连接符 76"/>
-          <p:cNvCxnSpPr/>
+          <p:cNvCxnSpPr>
+            <a:cxnSpLocks/>
+          </p:cNvCxnSpPr>
           <p:nvPr>
             <p:custDataLst>
-              <p:tags r:id="rId22"/>
+              <p:tags r:id="rId19"/>
             </p:custDataLst>
           </p:nvPr>
         </p:nvCxnSpPr>
         <p:spPr>
           <a:xfrm>
-            <a:off x="5397500" y="1341120"/>
-            <a:ext cx="4445" cy="1380490"/>
+            <a:off x="5401945" y="1285875"/>
+            <a:ext cx="0" cy="395605"/>
           </a:xfrm>
           <a:prstGeom prst="straightConnector1">
             <a:avLst/>
@@ -4533,13 +4458,13 @@
           <p:cNvSpPr/>
           <p:nvPr>
             <p:custDataLst>
-              <p:tags r:id="rId23"/>
+              <p:tags r:id="rId20"/>
             </p:custDataLst>
           </p:nvPr>
         </p:nvSpPr>
         <p:spPr>
           <a:xfrm>
-            <a:off x="3927475" y="2709545"/>
+            <a:off x="3927475" y="1681480"/>
             <a:ext cx="2923540" cy="679450"/>
           </a:xfrm>
           <a:prstGeom prst="rect">
@@ -4572,18 +4497,19 @@
         </p:style>
         <p:txBody>
           <a:bodyPr rtlCol="0" anchor="ctr"/>
+          <a:lstStyle/>
           <a:p>
             <a:pPr algn="ctr"/>
             <a:r>
-              <a:rPr lang="en-US" altLang="zh-CN">
+              <a:rPr lang="en-US" altLang="zh-CN" dirty="0">
                 <a:solidFill>
                   <a:schemeClr val="tx1"/>
                 </a:solidFill>
                 <a:sym typeface="+mn-ea"/>
               </a:rPr>
-              <a:t>All threads detect “Changing” status</a:t>
-            </a:r>
-            <a:endParaRPr lang="zh-CN" altLang="en-US"/>
+              <a:t>Detect Rebuilding status</a:t>
+            </a:r>
+            <a:endParaRPr lang="zh-CN" altLang="en-US" dirty="0"/>
           </a:p>
         </p:txBody>
       </p:sp>
@@ -4593,7 +4519,7 @@
           <p:cNvSpPr/>
           <p:nvPr>
             <p:custDataLst>
-              <p:tags r:id="rId24"/>
+              <p:tags r:id="rId21"/>
             </p:custDataLst>
           </p:nvPr>
         </p:nvSpPr>
@@ -4632,6 +4558,7 @@
         </p:style>
         <p:txBody>
           <a:bodyPr rtlCol="0" anchor="ctr"/>
+          <a:lstStyle/>
           <a:p>
             <a:pPr algn="ctr"/>
             <a:r>
@@ -4642,28 +4569,26 @@
               </a:rPr>
               <a:t>Worker threads</a:t>
             </a:r>
-            <a:endParaRPr lang="en-US" altLang="zh-CN">
-              <a:solidFill>
-                <a:schemeClr val="tx1"/>
-              </a:solidFill>
-            </a:endParaRPr>
           </a:p>
         </p:txBody>
       </p:sp>
       <p:cxnSp>
         <p:nvCxnSpPr>
           <p:cNvPr id="78" name="直接箭头连接符 77"/>
-          <p:cNvCxnSpPr/>
+          <p:cNvCxnSpPr>
+            <a:cxnSpLocks/>
+            <a:endCxn id="50" idx="0"/>
+          </p:cNvCxnSpPr>
           <p:nvPr>
             <p:custDataLst>
-              <p:tags r:id="rId25"/>
+              <p:tags r:id="rId22"/>
             </p:custDataLst>
           </p:nvPr>
         </p:nvCxnSpPr>
         <p:spPr>
           <a:xfrm>
-            <a:off x="5403215" y="3387725"/>
-            <a:ext cx="1270" cy="245745"/>
+            <a:off x="5396426" y="2345371"/>
+            <a:ext cx="7107" cy="365760"/>
           </a:xfrm>
           <a:prstGeom prst="straightConnector1">
             <a:avLst/>
@@ -4697,17 +4622,20 @@
       <p:cxnSp>
         <p:nvCxnSpPr>
           <p:cNvPr id="79" name="直接箭头连接符 78"/>
-          <p:cNvCxnSpPr/>
+          <p:cNvCxnSpPr>
+            <a:cxnSpLocks/>
+            <a:stCxn id="50" idx="2"/>
+          </p:cNvCxnSpPr>
           <p:nvPr>
             <p:custDataLst>
-              <p:tags r:id="rId26"/>
+              <p:tags r:id="rId23"/>
             </p:custDataLst>
           </p:nvPr>
         </p:nvCxnSpPr>
         <p:spPr>
-          <a:xfrm>
-            <a:off x="5401945" y="4338955"/>
-            <a:ext cx="1270" cy="245745"/>
+          <a:xfrm flipH="1">
+            <a:off x="5403215" y="3416616"/>
+            <a:ext cx="318" cy="578745"/>
           </a:xfrm>
           <a:prstGeom prst="straightConnector1">
             <a:avLst/>
@@ -4742,14 +4670,15 @@
         <p:nvCxnSpPr>
           <p:cNvPr id="81" name="肘形连接符 80"/>
           <p:cNvCxnSpPr>
+            <a:cxnSpLocks/>
             <a:stCxn id="46" idx="3"/>
           </p:cNvCxnSpPr>
           <p:nvPr/>
         </p:nvCxnSpPr>
         <p:spPr>
           <a:xfrm>
-            <a:off x="6184900" y="5120640"/>
-            <a:ext cx="173990" cy="1718945"/>
+            <a:off x="6184900" y="4531301"/>
+            <a:ext cx="168911" cy="2333684"/>
           </a:xfrm>
           <a:prstGeom prst="bentConnector2">
             <a:avLst/>
@@ -4785,7 +4714,7 @@
           <p:cNvSpPr/>
           <p:nvPr>
             <p:custDataLst>
-              <p:tags r:id="rId27"/>
+              <p:tags r:id="rId24"/>
             </p:custDataLst>
           </p:nvPr>
         </p:nvSpPr>
@@ -4824,21 +4753,17 @@
         </p:style>
         <p:txBody>
           <a:bodyPr rtlCol="0" anchor="ctr"/>
+          <a:lstStyle/>
           <a:p>
             <a:pPr algn="ctr"/>
             <a:r>
-              <a:rPr lang="en-US" altLang="zh-CN" sz="1600">
+              <a:rPr lang="en-US" altLang="zh-CN" sz="1600" dirty="0">
                 <a:solidFill>
                   <a:schemeClr val="tx1"/>
                 </a:solidFill>
               </a:rPr>
-              <a:t>Mark garbage</a:t>
-            </a:r>
-            <a:endParaRPr lang="en-US" altLang="zh-CN" sz="1600">
-              <a:solidFill>
-                <a:schemeClr val="tx1"/>
-              </a:solidFill>
-            </a:endParaRPr>
+              <a:t>Mark stale</a:t>
+            </a:r>
           </a:p>
         </p:txBody>
       </p:sp>
@@ -4848,7 +4773,7 @@
           <p:cNvCxnSpPr/>
           <p:nvPr>
             <p:custDataLst>
-              <p:tags r:id="rId28"/>
+              <p:tags r:id="rId25"/>
             </p:custDataLst>
           </p:nvPr>
         </p:nvCxnSpPr>
@@ -4889,7 +4814,7 @@
           <p:cNvCxnSpPr/>
           <p:nvPr>
             <p:custDataLst>
-              <p:tags r:id="rId29"/>
+              <p:tags r:id="rId26"/>
             </p:custDataLst>
           </p:nvPr>
         </p:nvCxnSpPr>
@@ -4926,84 +4851,14 @@
       </p:cxnSp>
       <p:sp>
         <p:nvSpPr>
-          <p:cNvPr id="86" name="椭圆形标注 85"/>
-          <p:cNvSpPr/>
-          <p:nvPr/>
-        </p:nvSpPr>
-        <p:spPr>
-          <a:xfrm>
-            <a:off x="3674110" y="1504315"/>
-            <a:ext cx="1663700" cy="768985"/>
-          </a:xfrm>
-          <a:prstGeom prst="wedgeEllipseCallout">
-            <a:avLst>
-              <a:gd name="adj1" fmla="val 50657"/>
-              <a:gd name="adj2" fmla="val 70114"/>
-            </a:avLst>
-          </a:prstGeom>
-          <a:solidFill>
-            <a:schemeClr val="bg1"/>
-          </a:solidFill>
-          <a:ln>
-            <a:solidFill>
-              <a:schemeClr val="tx1"/>
-            </a:solidFill>
-          </a:ln>
-        </p:spPr>
-        <p:style>
-          <a:lnRef idx="2">
-            <a:schemeClr val="accent1">
-              <a:shade val="50000"/>
-            </a:schemeClr>
-          </a:lnRef>
-          <a:fillRef idx="1">
-            <a:schemeClr val="accent1"/>
-          </a:fillRef>
-          <a:effectRef idx="0">
-            <a:schemeClr val="accent1"/>
-          </a:effectRef>
-          <a:fontRef idx="minor">
-            <a:schemeClr val="lt1"/>
-          </a:fontRef>
-        </p:style>
-        <p:txBody>
-          <a:bodyPr rtlCol="0" anchor="ctr"/>
-          <a:p>
-            <a:pPr algn="ctr"/>
-            <a:r>
-              <a:rPr lang="en-US" altLang="zh-CN" sz="1600">
-                <a:solidFill>
-                  <a:schemeClr val="tx1"/>
-                </a:solidFill>
-              </a:rPr>
-              <a:t>Normal access to HAM</a:t>
-            </a:r>
-            <a:r>
-              <a:rPr lang="en-US" altLang="zh-CN" baseline="-25000">
-                <a:solidFill>
-                  <a:schemeClr val="tx1"/>
-                </a:solidFill>
-              </a:rPr>
-              <a:t>old</a:t>
-            </a:r>
-            <a:endParaRPr lang="en-US" altLang="zh-CN" baseline="-25000">
-              <a:solidFill>
-                <a:schemeClr val="tx1"/>
-              </a:solidFill>
-            </a:endParaRPr>
-          </a:p>
-        </p:txBody>
-      </p:sp>
-      <p:sp>
-        <p:nvSpPr>
-          <p:cNvPr id="87" name="文本框 86"/>
+          <p:cNvPr id="89" name="文本框 88"/>
           <p:cNvSpPr txBox="1"/>
           <p:nvPr/>
         </p:nvSpPr>
         <p:spPr>
           <a:xfrm>
-            <a:off x="5445125" y="7580630"/>
-            <a:ext cx="1525270" cy="337185"/>
+            <a:off x="6420485" y="1628698"/>
+            <a:ext cx="386080" cy="337185"/>
           </a:xfrm>
           <a:prstGeom prst="rect">
             <a:avLst/>
@@ -5011,28 +4866,30 @@
           <a:noFill/>
         </p:spPr>
         <p:txBody>
-          <a:bodyPr wrap="square" rtlCol="0">
+          <a:bodyPr wrap="none" rtlCol="0" anchor="t">
             <a:spAutoFit/>
           </a:bodyPr>
-          <a:p>
-            <a:pPr algn="ctr"/>
-            <a:r>
-              <a:rPr lang="en-US" altLang="zh-CN" sz="1600"/>
-              <a:t>RCU-like barrier</a:t>
-            </a:r>
-            <a:endParaRPr lang="en-US" altLang="zh-CN" sz="1600"/>
-          </a:p>
-        </p:txBody>
-      </p:sp>
-      <p:sp>
-        <p:nvSpPr>
-          <p:cNvPr id="89" name="文本框 88"/>
+          <a:lstStyle/>
+          <a:p>
+            <a:r>
+              <a:rPr lang="zh-CN" altLang="en-US" sz="1600" dirty="0">
+                <a:latin typeface="微软雅黑" panose="020B0503020204020204" charset="-122"/>
+                <a:ea typeface="微软雅黑" panose="020B0503020204020204" charset="-122"/>
+              </a:rPr>
+              <a:t>①</a:t>
+            </a:r>
+          </a:p>
+        </p:txBody>
+      </p:sp>
+      <p:sp>
+        <p:nvSpPr>
+          <p:cNvPr id="90" name="文本框 89"/>
           <p:cNvSpPr txBox="1"/>
           <p:nvPr/>
         </p:nvSpPr>
         <p:spPr>
           <a:xfrm>
-            <a:off x="6420485" y="3056255"/>
+            <a:off x="6095365" y="2644456"/>
             <a:ext cx="386080" cy="337185"/>
           </a:xfrm>
           <a:prstGeom prst="rect">
@@ -5044,30 +4901,27 @@
           <a:bodyPr wrap="none" rtlCol="0" anchor="t">
             <a:spAutoFit/>
           </a:bodyPr>
-          <a:p>
-            <a:r>
-              <a:rPr lang="zh-CN" altLang="en-US" sz="1600">
+          <a:lstStyle/>
+          <a:p>
+            <a:r>
+              <a:rPr lang="zh-CN" altLang="en-US" sz="1600" dirty="0">
                 <a:latin typeface="微软雅黑" panose="020B0503020204020204" charset="-122"/>
                 <a:ea typeface="微软雅黑" panose="020B0503020204020204" charset="-122"/>
               </a:rPr>
-              <a:t>①</a:t>
-            </a:r>
-            <a:endParaRPr lang="zh-CN" altLang="en-US" sz="1600">
-              <a:latin typeface="微软雅黑" panose="020B0503020204020204" charset="-122"/>
-              <a:ea typeface="微软雅黑" panose="020B0503020204020204" charset="-122"/>
-            </a:endParaRPr>
-          </a:p>
-        </p:txBody>
-      </p:sp>
-      <p:sp>
-        <p:nvSpPr>
-          <p:cNvPr id="90" name="文本框 89"/>
+              <a:t>②</a:t>
+            </a:r>
+          </a:p>
+        </p:txBody>
+      </p:sp>
+      <p:sp>
+        <p:nvSpPr>
+          <p:cNvPr id="91" name="文本框 90"/>
           <p:cNvSpPr txBox="1"/>
           <p:nvPr/>
         </p:nvSpPr>
         <p:spPr>
           <a:xfrm>
-            <a:off x="6095365" y="3566795"/>
+            <a:off x="4864735" y="6713855"/>
             <a:ext cx="386080" cy="337185"/>
           </a:xfrm>
           <a:prstGeom prst="rect">
@@ -5079,41 +4933,7 @@
           <a:bodyPr wrap="none" rtlCol="0" anchor="t">
             <a:spAutoFit/>
           </a:bodyPr>
-          <a:p>
-            <a:r>
-              <a:rPr lang="zh-CN" altLang="en-US" sz="1600">
-                <a:latin typeface="微软雅黑" panose="020B0503020204020204" charset="-122"/>
-                <a:ea typeface="微软雅黑" panose="020B0503020204020204" charset="-122"/>
-              </a:rPr>
-              <a:t>②</a:t>
-            </a:r>
-            <a:endParaRPr lang="zh-CN" altLang="en-US" sz="1600">
-              <a:latin typeface="微软雅黑" panose="020B0503020204020204" charset="-122"/>
-              <a:ea typeface="微软雅黑" panose="020B0503020204020204" charset="-122"/>
-            </a:endParaRPr>
-          </a:p>
-        </p:txBody>
-      </p:sp>
-      <p:sp>
-        <p:nvSpPr>
-          <p:cNvPr id="91" name="文本框 90"/>
-          <p:cNvSpPr txBox="1"/>
-          <p:nvPr/>
-        </p:nvSpPr>
-        <p:spPr>
-          <a:xfrm>
-            <a:off x="4864735" y="6713855"/>
-            <a:ext cx="386080" cy="337185"/>
-          </a:xfrm>
-          <a:prstGeom prst="rect">
-            <a:avLst/>
-          </a:prstGeom>
-          <a:noFill/>
-        </p:spPr>
-        <p:txBody>
-          <a:bodyPr wrap="none" rtlCol="0" anchor="t">
-            <a:spAutoFit/>
-          </a:bodyPr>
+          <a:lstStyle/>
           <a:p>
             <a:r>
               <a:rPr lang="zh-CN" altLang="en-US" sz="1600">
@@ -5122,10 +4942,6 @@
               </a:rPr>
               <a:t>③</a:t>
             </a:r>
-            <a:endParaRPr lang="zh-CN" altLang="en-US" sz="1600">
-              <a:latin typeface="微软雅黑" panose="020B0503020204020204" charset="-122"/>
-              <a:ea typeface="微软雅黑" panose="020B0503020204020204" charset="-122"/>
-            </a:endParaRPr>
           </a:p>
         </p:txBody>
       </p:sp>
@@ -5149,6 +4965,7 @@
           <a:bodyPr wrap="none" rtlCol="0" anchor="t">
             <a:spAutoFit/>
           </a:bodyPr>
+          <a:lstStyle/>
           <a:p>
             <a:r>
               <a:rPr lang="zh-CN" altLang="en-US" sz="1600">
@@ -5157,10 +4974,6 @@
               </a:rPr>
               <a:t>④</a:t>
             </a:r>
-            <a:endParaRPr lang="zh-CN" altLang="en-US" sz="1600">
-              <a:latin typeface="微软雅黑" panose="020B0503020204020204" charset="-122"/>
-              <a:ea typeface="微软雅黑" panose="020B0503020204020204" charset="-122"/>
-            </a:endParaRPr>
           </a:p>
         </p:txBody>
       </p:sp>
@@ -5173,7 +4986,7 @@
         <p:spPr>
           <a:xfrm>
             <a:off x="2825115" y="1643380"/>
-            <a:ext cx="386080" cy="337185"/>
+            <a:ext cx="372218" cy="369332"/>
           </a:xfrm>
           <a:prstGeom prst="rect">
             <a:avLst/>
@@ -5184,18 +4997,14 @@
           <a:bodyPr wrap="none" rtlCol="0" anchor="t">
             <a:spAutoFit/>
           </a:bodyPr>
-          <a:p>
-            <a:r>
-              <a:rPr lang="zh-CN" altLang="en-US" sz="1600">
-                <a:latin typeface="微软雅黑" panose="020B0503020204020204" charset="-122"/>
+          <a:lstStyle/>
+          <a:p>
+            <a:r>
+              <a:rPr lang="zh-CN" altLang="en-US" dirty="0">
                 <a:ea typeface="微软雅黑" panose="020B0503020204020204" charset="-122"/>
               </a:rPr>
               <a:t>➊</a:t>
             </a:r>
-            <a:endParaRPr lang="zh-CN" altLang="en-US" sz="1600">
-              <a:latin typeface="微软雅黑" panose="020B0503020204020204" charset="-122"/>
-              <a:ea typeface="微软雅黑" panose="020B0503020204020204" charset="-122"/>
-            </a:endParaRPr>
           </a:p>
         </p:txBody>
       </p:sp>
@@ -5207,8 +5016,8 @@
         </p:nvSpPr>
         <p:spPr>
           <a:xfrm>
-            <a:off x="2825115" y="2674620"/>
-            <a:ext cx="386080" cy="337185"/>
+            <a:off x="2833236" y="3603742"/>
+            <a:ext cx="372218" cy="369332"/>
           </a:xfrm>
           <a:prstGeom prst="rect">
             <a:avLst/>
@@ -5219,18 +5028,15 @@
           <a:bodyPr wrap="none" rtlCol="0" anchor="t">
             <a:spAutoFit/>
           </a:bodyPr>
-          <a:p>
-            <a:r>
-              <a:rPr lang="zh-CN" altLang="en-US" sz="1600">
+          <a:lstStyle/>
+          <a:p>
+            <a:r>
+              <a:rPr lang="zh-CN" altLang="en-US" dirty="0">
                 <a:latin typeface="微软雅黑" panose="020B0503020204020204" charset="-122"/>
                 <a:ea typeface="微软雅黑" panose="020B0503020204020204" charset="-122"/>
               </a:rPr>
               <a:t>➋</a:t>
             </a:r>
-            <a:endParaRPr lang="zh-CN" altLang="en-US" sz="1600">
-              <a:latin typeface="微软雅黑" panose="020B0503020204020204" charset="-122"/>
-              <a:ea typeface="微软雅黑" panose="020B0503020204020204" charset="-122"/>
-            </a:endParaRPr>
           </a:p>
         </p:txBody>
       </p:sp>
@@ -5242,8 +5048,8 @@
         </p:nvSpPr>
         <p:spPr>
           <a:xfrm>
-            <a:off x="2825115" y="3597275"/>
-            <a:ext cx="386080" cy="337185"/>
+            <a:off x="2825115" y="6795135"/>
+            <a:ext cx="372218" cy="369332"/>
           </a:xfrm>
           <a:prstGeom prst="rect">
             <a:avLst/>
@@ -5254,18 +5060,15 @@
           <a:bodyPr wrap="none" rtlCol="0" anchor="t">
             <a:spAutoFit/>
           </a:bodyPr>
-          <a:p>
-            <a:r>
-              <a:rPr lang="zh-CN" altLang="en-US" sz="1600">
+          <a:lstStyle/>
+          <a:p>
+            <a:r>
+              <a:rPr lang="zh-CN" altLang="en-US" dirty="0">
                 <a:latin typeface="微软雅黑" panose="020B0503020204020204" charset="-122"/>
                 <a:ea typeface="微软雅黑" panose="020B0503020204020204" charset="-122"/>
               </a:rPr>
               <a:t>➌</a:t>
             </a:r>
-            <a:endParaRPr lang="zh-CN" altLang="en-US" sz="1600">
-              <a:latin typeface="微软雅黑" panose="020B0503020204020204" charset="-122"/>
-              <a:ea typeface="微软雅黑" panose="020B0503020204020204" charset="-122"/>
-            </a:endParaRPr>
           </a:p>
         </p:txBody>
       </p:sp>
@@ -5277,8 +5080,8 @@
         </p:nvSpPr>
         <p:spPr>
           <a:xfrm>
-            <a:off x="2825115" y="7243445"/>
-            <a:ext cx="386080" cy="337185"/>
+            <a:off x="4664585" y="8116808"/>
+            <a:ext cx="372218" cy="369332"/>
           </a:xfrm>
           <a:prstGeom prst="rect">
             <a:avLst/>
@@ -5289,31 +5092,28 @@
           <a:bodyPr wrap="none" rtlCol="0" anchor="t">
             <a:spAutoFit/>
           </a:bodyPr>
-          <a:p>
-            <a:r>
-              <a:rPr lang="zh-CN" altLang="en-US" sz="1600">
+          <a:lstStyle/>
+          <a:p>
+            <a:r>
+              <a:rPr lang="zh-CN" altLang="en-US" dirty="0">
                 <a:latin typeface="微软雅黑" panose="020B0503020204020204" charset="-122"/>
                 <a:ea typeface="微软雅黑" panose="020B0503020204020204" charset="-122"/>
               </a:rPr>
               <a:t>➍</a:t>
             </a:r>
-            <a:endParaRPr lang="zh-CN" altLang="en-US" sz="1600">
-              <a:latin typeface="微软雅黑" panose="020B0503020204020204" charset="-122"/>
-              <a:ea typeface="微软雅黑" panose="020B0503020204020204" charset="-122"/>
-            </a:endParaRPr>
-          </a:p>
-        </p:txBody>
-      </p:sp>
-      <p:sp>
-        <p:nvSpPr>
-          <p:cNvPr id="98" name="文本框 97"/>
+          </a:p>
+        </p:txBody>
+      </p:sp>
+      <p:sp>
+        <p:nvSpPr>
+          <p:cNvPr id="104" name="文本框 103"/>
           <p:cNvSpPr txBox="1"/>
           <p:nvPr/>
         </p:nvSpPr>
         <p:spPr>
           <a:xfrm>
-            <a:off x="3074035" y="8129270"/>
-            <a:ext cx="386080" cy="337185"/>
+            <a:off x="4048125" y="4447014"/>
+            <a:ext cx="506730" cy="368300"/>
           </a:xfrm>
           <a:prstGeom prst="rect">
             <a:avLst/>
@@ -5321,34 +5121,32 @@
           <a:noFill/>
         </p:spPr>
         <p:txBody>
-          <a:bodyPr wrap="none" rtlCol="0" anchor="t">
+          <a:bodyPr wrap="square" rtlCol="0">
             <a:spAutoFit/>
           </a:bodyPr>
-          <a:p>
-            <a:r>
-              <a:rPr lang="zh-CN" altLang="en-US" sz="1600">
-                <a:latin typeface="微软雅黑" panose="020B0503020204020204" charset="-122"/>
-                <a:ea typeface="微软雅黑" panose="020B0503020204020204" charset="-122"/>
-              </a:rPr>
-              <a:t>➎</a:t>
-            </a:r>
-            <a:endParaRPr lang="zh-CN" altLang="en-US" sz="1600">
-              <a:latin typeface="微软雅黑" panose="020B0503020204020204" charset="-122"/>
-              <a:ea typeface="微软雅黑" panose="020B0503020204020204" charset="-122"/>
-            </a:endParaRPr>
-          </a:p>
-        </p:txBody>
-      </p:sp>
-      <p:sp>
-        <p:nvSpPr>
-          <p:cNvPr id="99" name="文本框 98"/>
+          <a:lstStyle/>
+          <a:p>
+            <a:r>
+              <a:rPr lang="en-US" altLang="zh-CN" dirty="0"/>
+              <a:t>Yes</a:t>
+            </a:r>
+          </a:p>
+        </p:txBody>
+      </p:sp>
+      <p:sp>
+        <p:nvSpPr>
+          <p:cNvPr id="105" name="文本框 104"/>
           <p:cNvSpPr txBox="1"/>
-          <p:nvPr/>
-        </p:nvSpPr>
-        <p:spPr>
-          <a:xfrm>
-            <a:off x="6354445" y="8517255"/>
-            <a:ext cx="386080" cy="337185"/>
+          <p:nvPr>
+            <p:custDataLst>
+              <p:tags r:id="rId27"/>
+            </p:custDataLst>
+          </p:nvPr>
+        </p:nvSpPr>
+        <p:spPr>
+          <a:xfrm>
+            <a:off x="6355080" y="4447014"/>
+            <a:ext cx="480060" cy="368300"/>
           </a:xfrm>
           <a:prstGeom prst="rect">
             <a:avLst/>
@@ -5356,152 +5154,15 @@
           <a:noFill/>
         </p:spPr>
         <p:txBody>
-          <a:bodyPr wrap="none" rtlCol="0" anchor="t">
-            <a:spAutoFit/>
-          </a:bodyPr>
-          <a:p>
-            <a:r>
-              <a:rPr lang="zh-CN" altLang="en-US" sz="1600">
-                <a:latin typeface="微软雅黑" panose="020B0503020204020204" charset="-122"/>
-                <a:ea typeface="微软雅黑" panose="020B0503020204020204" charset="-122"/>
-              </a:rPr>
-              <a:t>➏</a:t>
-            </a:r>
-            <a:endParaRPr lang="zh-CN" altLang="en-US" sz="1600">
-              <a:latin typeface="微软雅黑" panose="020B0503020204020204" charset="-122"/>
-              <a:ea typeface="微软雅黑" panose="020B0503020204020204" charset="-122"/>
-            </a:endParaRPr>
-          </a:p>
-        </p:txBody>
-      </p:sp>
-      <p:sp>
-        <p:nvSpPr>
-          <p:cNvPr id="100" name="文本框 99"/>
-          <p:cNvSpPr txBox="1"/>
-          <p:nvPr/>
-        </p:nvSpPr>
-        <p:spPr>
-          <a:xfrm>
-            <a:off x="5725795" y="4936490"/>
-            <a:ext cx="369570" cy="368300"/>
-          </a:xfrm>
-          <a:prstGeom prst="rect">
-            <a:avLst/>
-          </a:prstGeom>
-          <a:noFill/>
-        </p:spPr>
-        <p:txBody>
-          <a:bodyPr wrap="square" rtlCol="0" anchor="t">
-            <a:spAutoFit/>
-          </a:bodyPr>
-          <a:p>
-            <a:r>
-              <a:rPr lang="zh-CN" altLang="en-US">
-                <a:latin typeface="微软雅黑" panose="020B0503020204020204" charset="-122"/>
-                <a:ea typeface="微软雅黑" panose="020B0503020204020204" charset="-122"/>
-              </a:rPr>
-              <a:t>★</a:t>
-            </a:r>
-            <a:endParaRPr lang="zh-CN" altLang="en-US">
-              <a:latin typeface="微软雅黑" panose="020B0503020204020204" charset="-122"/>
-              <a:ea typeface="微软雅黑" panose="020B0503020204020204" charset="-122"/>
-            </a:endParaRPr>
-          </a:p>
-        </p:txBody>
-      </p:sp>
-      <p:sp>
-        <p:nvSpPr>
-          <p:cNvPr id="103" name="文本框 102"/>
-          <p:cNvSpPr txBox="1"/>
-          <p:nvPr>
-            <p:custDataLst>
-              <p:tags r:id="rId30"/>
-            </p:custDataLst>
-          </p:nvPr>
-        </p:nvSpPr>
-        <p:spPr>
-          <a:xfrm>
-            <a:off x="5932805" y="2143760"/>
-            <a:ext cx="1047750" cy="337185"/>
-          </a:xfrm>
-          <a:prstGeom prst="rect">
-            <a:avLst/>
-          </a:prstGeom>
-          <a:noFill/>
-        </p:spPr>
-        <p:txBody>
           <a:bodyPr wrap="square" rtlCol="0">
             <a:spAutoFit/>
           </a:bodyPr>
-          <a:p>
-            <a:pPr algn="ctr"/>
-            <a:r>
-              <a:rPr lang="en-US" altLang="zh-CN" sz="1600"/>
-              <a:t>No barrier</a:t>
-            </a:r>
-            <a:endParaRPr lang="en-US" altLang="zh-CN" sz="1600"/>
-          </a:p>
-        </p:txBody>
-      </p:sp>
-      <p:sp>
-        <p:nvSpPr>
-          <p:cNvPr id="104" name="文本框 103"/>
-          <p:cNvSpPr txBox="1"/>
-          <p:nvPr/>
-        </p:nvSpPr>
-        <p:spPr>
-          <a:xfrm>
-            <a:off x="4048125" y="5120640"/>
-            <a:ext cx="506730" cy="368300"/>
-          </a:xfrm>
-          <a:prstGeom prst="rect">
-            <a:avLst/>
-          </a:prstGeom>
-          <a:noFill/>
-        </p:spPr>
-        <p:txBody>
-          <a:bodyPr wrap="square" rtlCol="0">
-            <a:spAutoFit/>
-          </a:bodyPr>
-          <a:p>
-            <a:r>
-              <a:rPr lang="en-US" altLang="zh-CN"/>
-              <a:t>Yes</a:t>
-            </a:r>
-            <a:endParaRPr lang="en-US" altLang="zh-CN"/>
-          </a:p>
-        </p:txBody>
-      </p:sp>
-      <p:sp>
-        <p:nvSpPr>
-          <p:cNvPr id="105" name="文本框 104"/>
-          <p:cNvSpPr txBox="1"/>
-          <p:nvPr>
-            <p:custDataLst>
-              <p:tags r:id="rId31"/>
-            </p:custDataLst>
-          </p:nvPr>
-        </p:nvSpPr>
-        <p:spPr>
-          <a:xfrm>
-            <a:off x="6355080" y="5120640"/>
-            <a:ext cx="480060" cy="368300"/>
-          </a:xfrm>
-          <a:prstGeom prst="rect">
-            <a:avLst/>
-          </a:prstGeom>
-          <a:noFill/>
-        </p:spPr>
-        <p:txBody>
-          <a:bodyPr wrap="square" rtlCol="0">
-            <a:spAutoFit/>
-          </a:bodyPr>
-          <a:p>
-            <a:r>
-              <a:rPr lang="en-US" altLang="zh-CN"/>
+          <a:lstStyle/>
+          <a:p>
+            <a:r>
+              <a:rPr lang="en-US" altLang="zh-CN" dirty="0"/>
               <a:t>No</a:t>
             </a:r>
-            <a:endParaRPr lang="en-US" altLang="zh-CN"/>
           </a:p>
         </p:txBody>
       </p:sp>
@@ -5511,13 +5172,13 @@
           <p:cNvSpPr/>
           <p:nvPr>
             <p:custDataLst>
-              <p:tags r:id="rId32"/>
+              <p:tags r:id="rId28"/>
             </p:custDataLst>
           </p:nvPr>
         </p:nvSpPr>
         <p:spPr>
           <a:xfrm>
-            <a:off x="3789045" y="5541645"/>
+            <a:off x="3789045" y="5150195"/>
             <a:ext cx="1409700" cy="719455"/>
           </a:xfrm>
           <a:prstGeom prst="diamond">
@@ -5550,17 +5211,10 @@
         </p:style>
         <p:txBody>
           <a:bodyPr rtlCol="0" anchor="ctr"/>
+          <a:lstStyle/>
           <a:p>
             <a:pPr algn="ctr"/>
-            <a:r>
-              <a:rPr lang="en-US" altLang="zh-CN" sz="1600">
-                <a:solidFill>
-                  <a:schemeClr val="tx1"/>
-                </a:solidFill>
-              </a:rPr>
-              <a:t>Check Valid</a:t>
-            </a:r>
-            <a:endParaRPr lang="en-US" altLang="zh-CN" sz="1600">
+            <a:endParaRPr lang="en-US" altLang="zh-CN" sz="1600" dirty="0">
               <a:solidFill>
                 <a:schemeClr val="tx1"/>
               </a:solidFill>
@@ -5579,8 +5233,8 @@
         </p:nvCxnSpPr>
         <p:spPr>
           <a:xfrm rot="10800000" flipV="1">
-            <a:off x="4493895" y="5120640"/>
-            <a:ext cx="128905" cy="421005"/>
+            <a:off x="4493896" y="4531301"/>
+            <a:ext cx="128905" cy="618894"/>
           </a:xfrm>
           <a:prstGeom prst="bentConnector2">
             <a:avLst/>
@@ -5614,14 +5268,15 @@
         <p:nvCxnSpPr>
           <p:cNvPr id="112" name="肘形连接符 111"/>
           <p:cNvCxnSpPr>
+            <a:cxnSpLocks/>
             <a:stCxn id="110" idx="3"/>
           </p:cNvCxnSpPr>
           <p:nvPr/>
         </p:nvCxnSpPr>
         <p:spPr>
           <a:xfrm>
-            <a:off x="5198745" y="5901690"/>
-            <a:ext cx="648970" cy="956310"/>
+            <a:off x="5198745" y="5509923"/>
+            <a:ext cx="671830" cy="1355062"/>
           </a:xfrm>
           <a:prstGeom prst="bentConnector2">
             <a:avLst/>
@@ -5654,17 +5309,20 @@
       <p:cxnSp>
         <p:nvCxnSpPr>
           <p:cNvPr id="114" name="直接箭头连接符 113"/>
-          <p:cNvCxnSpPr/>
+          <p:cNvCxnSpPr>
+            <a:cxnSpLocks/>
+            <a:stCxn id="110" idx="2"/>
+          </p:cNvCxnSpPr>
           <p:nvPr>
             <p:custDataLst>
-              <p:tags r:id="rId33"/>
+              <p:tags r:id="rId29"/>
             </p:custDataLst>
           </p:nvPr>
         </p:nvCxnSpPr>
         <p:spPr>
           <a:xfrm>
-            <a:off x="4493895" y="6261100"/>
-            <a:ext cx="0" cy="297815"/>
+            <a:off x="4493895" y="5869650"/>
+            <a:ext cx="0" cy="497144"/>
           </a:xfrm>
           <a:prstGeom prst="straightConnector1">
             <a:avLst/>
@@ -5740,14 +5398,14 @@
           <p:cNvSpPr txBox="1"/>
           <p:nvPr>
             <p:custDataLst>
-              <p:tags r:id="rId34"/>
+              <p:tags r:id="rId30"/>
             </p:custDataLst>
           </p:nvPr>
         </p:nvSpPr>
         <p:spPr>
           <a:xfrm>
-            <a:off x="4493895" y="6190615"/>
-            <a:ext cx="633730" cy="368300"/>
+            <a:off x="4493894" y="5934072"/>
+            <a:ext cx="756909" cy="369332"/>
           </a:xfrm>
           <a:prstGeom prst="rect">
             <a:avLst/>
@@ -5758,12 +5416,12 @@
           <a:bodyPr wrap="square" rtlCol="0">
             <a:spAutoFit/>
           </a:bodyPr>
-          <a:p>
-            <a:r>
-              <a:rPr lang="en-US" altLang="zh-CN"/>
-              <a:t>true</a:t>
-            </a:r>
-            <a:endParaRPr lang="en-US" altLang="zh-CN"/>
+          <a:lstStyle/>
+          <a:p>
+            <a:r>
+              <a:rPr lang="en-US" altLang="zh-CN" dirty="0"/>
+              <a:t>False</a:t>
+            </a:r>
           </a:p>
         </p:txBody>
       </p:sp>
@@ -5773,14 +5431,14 @@
           <p:cNvSpPr txBox="1"/>
           <p:nvPr>
             <p:custDataLst>
-              <p:tags r:id="rId35"/>
+              <p:tags r:id="rId31"/>
             </p:custDataLst>
           </p:nvPr>
         </p:nvSpPr>
         <p:spPr>
           <a:xfrm>
-            <a:off x="5250815" y="5892800"/>
-            <a:ext cx="633730" cy="368300"/>
+            <a:off x="5250814" y="5892800"/>
+            <a:ext cx="757557" cy="369332"/>
           </a:xfrm>
           <a:prstGeom prst="rect">
             <a:avLst/>
@@ -5791,25 +5449,29 @@
           <a:bodyPr wrap="square" rtlCol="0">
             <a:spAutoFit/>
           </a:bodyPr>
-          <a:p>
-            <a:r>
-              <a:rPr lang="en-US" altLang="zh-CN"/>
-              <a:t>false</a:t>
-            </a:r>
-            <a:endParaRPr lang="en-US" altLang="zh-CN"/>
-          </a:p>
-        </p:txBody>
-      </p:sp>
-      <p:sp>
-        <p:nvSpPr>
-          <p:cNvPr id="119" name="文本框 118"/>
+          <a:lstStyle/>
+          <a:p>
+            <a:r>
+              <a:rPr lang="en-US" altLang="zh-CN" dirty="0"/>
+              <a:t>True</a:t>
+            </a:r>
+          </a:p>
+        </p:txBody>
+      </p:sp>
+      <p:sp>
+        <p:nvSpPr>
+          <p:cNvPr id="120" name="文本框 119"/>
           <p:cNvSpPr txBox="1"/>
-          <p:nvPr/>
-        </p:nvSpPr>
-        <p:spPr>
-          <a:xfrm>
-            <a:off x="4744720" y="5717540"/>
-            <a:ext cx="268605" cy="368300"/>
+          <p:nvPr>
+            <p:custDataLst>
+              <p:tags r:id="rId32"/>
+            </p:custDataLst>
+          </p:nvPr>
+        </p:nvSpPr>
+        <p:spPr>
+          <a:xfrm>
+            <a:off x="1795780" y="4855210"/>
+            <a:ext cx="856736" cy="369332"/>
           </a:xfrm>
           <a:prstGeom prst="rect">
             <a:avLst/>
@@ -5817,40 +5479,34 @@
           <a:noFill/>
         </p:spPr>
         <p:txBody>
-          <a:bodyPr wrap="square" rtlCol="0" anchor="t">
+          <a:bodyPr wrap="square" rtlCol="0">
             <a:spAutoFit/>
           </a:bodyPr>
-          <a:p>
-            <a:r>
-              <a:rPr lang="zh-CN" altLang="en-US">
-                <a:latin typeface="微软雅黑" panose="020B0503020204020204" charset="-122"/>
-                <a:ea typeface="微软雅黑" panose="020B0503020204020204" charset="-122"/>
-                <a:sym typeface="+mn-ea"/>
-              </a:rPr>
-              <a:t>♠</a:t>
-            </a:r>
-            <a:endParaRPr lang="zh-CN" altLang="en-US">
-              <a:latin typeface="微软雅黑" panose="020B0503020204020204" charset="-122"/>
-              <a:ea typeface="微软雅黑" panose="020B0503020204020204" charset="-122"/>
-              <a:sym typeface="+mn-ea"/>
-            </a:endParaRPr>
-          </a:p>
-        </p:txBody>
-      </p:sp>
-      <p:sp>
-        <p:nvSpPr>
-          <p:cNvPr id="120" name="文本框 119"/>
+          <a:lstStyle/>
+          <a:p>
+            <a:r>
+              <a:rPr lang="en-US" altLang="zh-CN" dirty="0"/>
+              <a:t>False</a:t>
+            </a:r>
+          </a:p>
+        </p:txBody>
+      </p:sp>
+      <p:sp>
+        <p:nvSpPr>
+          <p:cNvPr id="13" name="TextBox 12">
+            <a:extLst>
+              <a:ext uri="{FF2B5EF4-FFF2-40B4-BE49-F238E27FC236}">
+                <a16:creationId xmlns:a16="http://schemas.microsoft.com/office/drawing/2014/main" id="{BF3009B6-3CAA-8F76-F55B-4D69A34A8A58}"/>
+              </a:ext>
+            </a:extLst>
+          </p:cNvPr>
           <p:cNvSpPr txBox="1"/>
-          <p:nvPr>
-            <p:custDataLst>
-              <p:tags r:id="rId36"/>
-            </p:custDataLst>
-          </p:nvPr>
-        </p:nvSpPr>
-        <p:spPr>
-          <a:xfrm>
-            <a:off x="1795780" y="4855210"/>
-            <a:ext cx="633730" cy="368300"/>
+          <p:nvPr/>
+        </p:nvSpPr>
+        <p:spPr>
+          <a:xfrm>
+            <a:off x="4792981" y="4346496"/>
+            <a:ext cx="1215397" cy="338554"/>
           </a:xfrm>
           <a:prstGeom prst="rect">
             <a:avLst/>
@@ -5858,15 +5514,147 @@
           <a:noFill/>
         </p:spPr>
         <p:txBody>
+          <a:bodyPr wrap="none" rtlCol="0">
+            <a:spAutoFit/>
+          </a:bodyPr>
+          <a:lstStyle/>
+          <a:p>
+            <a:r>
+              <a:rPr lang="en-US" altLang="zh-CN" sz="1600" dirty="0">
+                <a:solidFill>
+                  <a:schemeClr val="tx1"/>
+                </a:solidFill>
+              </a:rPr>
+              <a:t>In old HAM?</a:t>
+            </a:r>
+          </a:p>
+        </p:txBody>
+      </p:sp>
+      <p:sp>
+        <p:nvSpPr>
+          <p:cNvPr id="23" name="TextBox 22">
+            <a:extLst>
+              <a:ext uri="{FF2B5EF4-FFF2-40B4-BE49-F238E27FC236}">
+                <a16:creationId xmlns:a16="http://schemas.microsoft.com/office/drawing/2014/main" id="{9BBE5866-5690-3F7B-453F-DF9D835041AB}"/>
+              </a:ext>
+            </a:extLst>
+          </p:cNvPr>
+          <p:cNvSpPr txBox="1"/>
+          <p:nvPr/>
+        </p:nvSpPr>
+        <p:spPr>
+          <a:xfrm>
+            <a:off x="4069288" y="5192452"/>
+            <a:ext cx="830677" cy="584775"/>
+          </a:xfrm>
+          <a:prstGeom prst="rect">
+            <a:avLst/>
+          </a:prstGeom>
+          <a:noFill/>
+        </p:spPr>
+        <p:txBody>
+          <a:bodyPr wrap="none" rtlCol="0">
+            <a:spAutoFit/>
+          </a:bodyPr>
+          <a:lstStyle/>
+          <a:p>
+            <a:pPr algn="ctr"/>
+            <a:r>
+              <a:rPr lang="en-US" altLang="zh-CN" sz="1600" dirty="0">
+                <a:solidFill>
+                  <a:schemeClr val="tx1"/>
+                </a:solidFill>
+              </a:rPr>
+              <a:t>Check</a:t>
+            </a:r>
+          </a:p>
+          <a:p>
+            <a:pPr algn="ctr"/>
+            <a:r>
+              <a:rPr lang="en-US" altLang="zh-CN" sz="1600" dirty="0">
+                <a:solidFill>
+                  <a:schemeClr val="tx1"/>
+                </a:solidFill>
+              </a:rPr>
+              <a:t>Flushed</a:t>
+            </a:r>
+          </a:p>
+        </p:txBody>
+      </p:sp>
+      <p:cxnSp>
+        <p:nvCxnSpPr>
+          <p:cNvPr id="30" name="直接连接符 14">
+            <a:extLst>
+              <a:ext uri="{FF2B5EF4-FFF2-40B4-BE49-F238E27FC236}">
+                <a16:creationId xmlns:a16="http://schemas.microsoft.com/office/drawing/2014/main" id="{9F99F1D2-CEFF-19B6-54E8-5AC3922A4151}"/>
+              </a:ext>
+            </a:extLst>
+          </p:cNvPr>
+          <p:cNvCxnSpPr/>
+          <p:nvPr/>
+        </p:nvCxnSpPr>
+        <p:spPr>
+          <a:xfrm>
+            <a:off x="375889" y="7928608"/>
+            <a:ext cx="6623050" cy="0"/>
+          </a:xfrm>
+          <a:prstGeom prst="line">
+            <a:avLst/>
+          </a:prstGeom>
+          <a:ln w="22225" cmpd="sng">
+            <a:solidFill>
+              <a:schemeClr val="tx1"/>
+            </a:solidFill>
+            <a:prstDash val="dash"/>
+          </a:ln>
+        </p:spPr>
+        <p:style>
+          <a:lnRef idx="1">
+            <a:schemeClr val="accent1"/>
+          </a:lnRef>
+          <a:fillRef idx="0">
+            <a:schemeClr val="accent1"/>
+          </a:fillRef>
+          <a:effectRef idx="0">
+            <a:schemeClr val="accent1"/>
+          </a:effectRef>
+          <a:fontRef idx="minor">
+            <a:schemeClr val="tx1"/>
+          </a:fontRef>
+        </p:style>
+      </p:cxnSp>
+      <p:sp>
+        <p:nvSpPr>
+          <p:cNvPr id="31" name="文本框 15">
+            <a:extLst>
+              <a:ext uri="{FF2B5EF4-FFF2-40B4-BE49-F238E27FC236}">
+                <a16:creationId xmlns:a16="http://schemas.microsoft.com/office/drawing/2014/main" id="{A6967338-A840-A0A2-BAA6-B09A8F5AE6FC}"/>
+              </a:ext>
+            </a:extLst>
+          </p:cNvPr>
+          <p:cNvSpPr txBox="1"/>
+          <p:nvPr/>
+        </p:nvSpPr>
+        <p:spPr>
+          <a:xfrm>
+            <a:off x="290956" y="7590054"/>
+            <a:ext cx="1357545" cy="338554"/>
+          </a:xfrm>
+          <a:prstGeom prst="rect">
+            <a:avLst/>
+          </a:prstGeom>
+          <a:noFill/>
+        </p:spPr>
+        <p:txBody>
           <a:bodyPr wrap="square" rtlCol="0">
             <a:spAutoFit/>
           </a:bodyPr>
-          <a:p>
-            <a:r>
-              <a:rPr lang="en-US" altLang="zh-CN"/>
-              <a:t>true</a:t>
-            </a:r>
-            <a:endParaRPr lang="en-US" altLang="zh-CN"/>
+          <a:lstStyle/>
+          <a:p>
+            <a:r>
+              <a:rPr lang="en-US" altLang="zh-CN" sz="1600" dirty="0"/>
+              <a:t>Barrier</a:t>
+            </a:r>
           </a:p>
         </p:txBody>
       </p:sp>
@@ -5879,224 +5667,200 @@
 </file>
 
 <file path=ppt/tags/tag1.xml><?xml version="1.0" encoding="utf-8"?>
-<p:tagLst xmlns:p="http://schemas.openxmlformats.org/presentationml/2006/main">
-  <p:tag name="KSO_WM_BEAUTIFY_FLAG" val=""/>
+<p:tagLst xmlns:a="http://schemas.openxmlformats.org/drawingml/2006/main" xmlns:r="http://schemas.openxmlformats.org/officeDocument/2006/relationships" xmlns:p="http://schemas.openxmlformats.org/presentationml/2006/main">
+  <p:tag name="COMMONDATA" val="eyJoZGlkIjoiNWMyNzk1NjJkYjg5Yzk1OTQwMjA3ODhmZjc4ODZlMTgifQ=="/>
+  <p:tag name="KSO_WPP_MARK_KEY" val="19333ca4-0f71-4f1d-900b-60a6380f1e3a"/>
 </p:tagLst>
 </file>
 
 <file path=ppt/tags/tag10.xml><?xml version="1.0" encoding="utf-8"?>
-<p:tagLst xmlns:p="http://schemas.openxmlformats.org/presentationml/2006/main">
+<p:tagLst xmlns:a="http://schemas.openxmlformats.org/drawingml/2006/main" xmlns:r="http://schemas.openxmlformats.org/officeDocument/2006/relationships" xmlns:p="http://schemas.openxmlformats.org/presentationml/2006/main">
   <p:tag name="KSO_WM_BEAUTIFY_FLAG" val=""/>
 </p:tagLst>
 </file>
 
 <file path=ppt/tags/tag11.xml><?xml version="1.0" encoding="utf-8"?>
-<p:tagLst xmlns:p="http://schemas.openxmlformats.org/presentationml/2006/main">
+<p:tagLst xmlns:a="http://schemas.openxmlformats.org/drawingml/2006/main" xmlns:r="http://schemas.openxmlformats.org/officeDocument/2006/relationships" xmlns:p="http://schemas.openxmlformats.org/presentationml/2006/main">
   <p:tag name="KSO_WM_BEAUTIFY_FLAG" val=""/>
 </p:tagLst>
 </file>
 
 <file path=ppt/tags/tag12.xml><?xml version="1.0" encoding="utf-8"?>
-<p:tagLst xmlns:p="http://schemas.openxmlformats.org/presentationml/2006/main">
+<p:tagLst xmlns:a="http://schemas.openxmlformats.org/drawingml/2006/main" xmlns:r="http://schemas.openxmlformats.org/officeDocument/2006/relationships" xmlns:p="http://schemas.openxmlformats.org/presentationml/2006/main">
   <p:tag name="KSO_WM_BEAUTIFY_FLAG" val=""/>
 </p:tagLst>
 </file>
 
 <file path=ppt/tags/tag13.xml><?xml version="1.0" encoding="utf-8"?>
-<p:tagLst xmlns:p="http://schemas.openxmlformats.org/presentationml/2006/main">
+<p:tagLst xmlns:a="http://schemas.openxmlformats.org/drawingml/2006/main" xmlns:r="http://schemas.openxmlformats.org/officeDocument/2006/relationships" xmlns:p="http://schemas.openxmlformats.org/presentationml/2006/main">
   <p:tag name="KSO_WM_BEAUTIFY_FLAG" val=""/>
 </p:tagLst>
 </file>
 
 <file path=ppt/tags/tag14.xml><?xml version="1.0" encoding="utf-8"?>
-<p:tagLst xmlns:p="http://schemas.openxmlformats.org/presentationml/2006/main">
+<p:tagLst xmlns:a="http://schemas.openxmlformats.org/drawingml/2006/main" xmlns:r="http://schemas.openxmlformats.org/officeDocument/2006/relationships" xmlns:p="http://schemas.openxmlformats.org/presentationml/2006/main">
   <p:tag name="KSO_WM_BEAUTIFY_FLAG" val=""/>
 </p:tagLst>
 </file>
 
 <file path=ppt/tags/tag15.xml><?xml version="1.0" encoding="utf-8"?>
-<p:tagLst xmlns:p="http://schemas.openxmlformats.org/presentationml/2006/main">
+<p:tagLst xmlns:a="http://schemas.openxmlformats.org/drawingml/2006/main" xmlns:r="http://schemas.openxmlformats.org/officeDocument/2006/relationships" xmlns:p="http://schemas.openxmlformats.org/presentationml/2006/main">
   <p:tag name="KSO_WM_BEAUTIFY_FLAG" val=""/>
 </p:tagLst>
 </file>
 
 <file path=ppt/tags/tag16.xml><?xml version="1.0" encoding="utf-8"?>
-<p:tagLst xmlns:p="http://schemas.openxmlformats.org/presentationml/2006/main">
+<p:tagLst xmlns:a="http://schemas.openxmlformats.org/drawingml/2006/main" xmlns:r="http://schemas.openxmlformats.org/officeDocument/2006/relationships" xmlns:p="http://schemas.openxmlformats.org/presentationml/2006/main">
   <p:tag name="KSO_WM_BEAUTIFY_FLAG" val=""/>
 </p:tagLst>
 </file>
 
 <file path=ppt/tags/tag17.xml><?xml version="1.0" encoding="utf-8"?>
-<p:tagLst xmlns:p="http://schemas.openxmlformats.org/presentationml/2006/main">
+<p:tagLst xmlns:a="http://schemas.openxmlformats.org/drawingml/2006/main" xmlns:r="http://schemas.openxmlformats.org/officeDocument/2006/relationships" xmlns:p="http://schemas.openxmlformats.org/presentationml/2006/main">
   <p:tag name="KSO_WM_BEAUTIFY_FLAG" val=""/>
 </p:tagLst>
 </file>
 
 <file path=ppt/tags/tag18.xml><?xml version="1.0" encoding="utf-8"?>
-<p:tagLst xmlns:p="http://schemas.openxmlformats.org/presentationml/2006/main">
+<p:tagLst xmlns:a="http://schemas.openxmlformats.org/drawingml/2006/main" xmlns:r="http://schemas.openxmlformats.org/officeDocument/2006/relationships" xmlns:p="http://schemas.openxmlformats.org/presentationml/2006/main">
   <p:tag name="KSO_WM_BEAUTIFY_FLAG" val=""/>
 </p:tagLst>
 </file>
 
 <file path=ppt/tags/tag19.xml><?xml version="1.0" encoding="utf-8"?>
-<p:tagLst xmlns:p="http://schemas.openxmlformats.org/presentationml/2006/main">
+<p:tagLst xmlns:a="http://schemas.openxmlformats.org/drawingml/2006/main" xmlns:r="http://schemas.openxmlformats.org/officeDocument/2006/relationships" xmlns:p="http://schemas.openxmlformats.org/presentationml/2006/main">
   <p:tag name="KSO_WM_BEAUTIFY_FLAG" val=""/>
 </p:tagLst>
 </file>
 
 <file path=ppt/tags/tag2.xml><?xml version="1.0" encoding="utf-8"?>
-<p:tagLst xmlns:p="http://schemas.openxmlformats.org/presentationml/2006/main">
+<p:tagLst xmlns:a="http://schemas.openxmlformats.org/drawingml/2006/main" xmlns:r="http://schemas.openxmlformats.org/officeDocument/2006/relationships" xmlns:p="http://schemas.openxmlformats.org/presentationml/2006/main">
   <p:tag name="KSO_WM_BEAUTIFY_FLAG" val=""/>
 </p:tagLst>
 </file>
 
 <file path=ppt/tags/tag20.xml><?xml version="1.0" encoding="utf-8"?>
-<p:tagLst xmlns:p="http://schemas.openxmlformats.org/presentationml/2006/main">
+<p:tagLst xmlns:a="http://schemas.openxmlformats.org/drawingml/2006/main" xmlns:r="http://schemas.openxmlformats.org/officeDocument/2006/relationships" xmlns:p="http://schemas.openxmlformats.org/presentationml/2006/main">
   <p:tag name="KSO_WM_BEAUTIFY_FLAG" val=""/>
 </p:tagLst>
 </file>
 
 <file path=ppt/tags/tag21.xml><?xml version="1.0" encoding="utf-8"?>
-<p:tagLst xmlns:p="http://schemas.openxmlformats.org/presentationml/2006/main">
+<p:tagLst xmlns:a="http://schemas.openxmlformats.org/drawingml/2006/main" xmlns:r="http://schemas.openxmlformats.org/officeDocument/2006/relationships" xmlns:p="http://schemas.openxmlformats.org/presentationml/2006/main">
   <p:tag name="KSO_WM_BEAUTIFY_FLAG" val=""/>
 </p:tagLst>
 </file>
 
 <file path=ppt/tags/tag22.xml><?xml version="1.0" encoding="utf-8"?>
-<p:tagLst xmlns:p="http://schemas.openxmlformats.org/presentationml/2006/main">
+<p:tagLst xmlns:a="http://schemas.openxmlformats.org/drawingml/2006/main" xmlns:r="http://schemas.openxmlformats.org/officeDocument/2006/relationships" xmlns:p="http://schemas.openxmlformats.org/presentationml/2006/main">
   <p:tag name="KSO_WM_BEAUTIFY_FLAG" val=""/>
 </p:tagLst>
 </file>
 
 <file path=ppt/tags/tag23.xml><?xml version="1.0" encoding="utf-8"?>
-<p:tagLst xmlns:p="http://schemas.openxmlformats.org/presentationml/2006/main">
+<p:tagLst xmlns:a="http://schemas.openxmlformats.org/drawingml/2006/main" xmlns:r="http://schemas.openxmlformats.org/officeDocument/2006/relationships" xmlns:p="http://schemas.openxmlformats.org/presentationml/2006/main">
   <p:tag name="KSO_WM_BEAUTIFY_FLAG" val=""/>
 </p:tagLst>
 </file>
 
 <file path=ppt/tags/tag24.xml><?xml version="1.0" encoding="utf-8"?>
-<p:tagLst xmlns:p="http://schemas.openxmlformats.org/presentationml/2006/main">
+<p:tagLst xmlns:a="http://schemas.openxmlformats.org/drawingml/2006/main" xmlns:r="http://schemas.openxmlformats.org/officeDocument/2006/relationships" xmlns:p="http://schemas.openxmlformats.org/presentationml/2006/main">
   <p:tag name="KSO_WM_BEAUTIFY_FLAG" val=""/>
 </p:tagLst>
 </file>
 
 <file path=ppt/tags/tag25.xml><?xml version="1.0" encoding="utf-8"?>
-<p:tagLst xmlns:p="http://schemas.openxmlformats.org/presentationml/2006/main">
+<p:tagLst xmlns:a="http://schemas.openxmlformats.org/drawingml/2006/main" xmlns:r="http://schemas.openxmlformats.org/officeDocument/2006/relationships" xmlns:p="http://schemas.openxmlformats.org/presentationml/2006/main">
   <p:tag name="KSO_WM_BEAUTIFY_FLAG" val=""/>
 </p:tagLst>
 </file>
 
 <file path=ppt/tags/tag26.xml><?xml version="1.0" encoding="utf-8"?>
-<p:tagLst xmlns:p="http://schemas.openxmlformats.org/presentationml/2006/main">
+<p:tagLst xmlns:a="http://schemas.openxmlformats.org/drawingml/2006/main" xmlns:r="http://schemas.openxmlformats.org/officeDocument/2006/relationships" xmlns:p="http://schemas.openxmlformats.org/presentationml/2006/main">
   <p:tag name="KSO_WM_BEAUTIFY_FLAG" val=""/>
 </p:tagLst>
 </file>
 
 <file path=ppt/tags/tag27.xml><?xml version="1.0" encoding="utf-8"?>
-<p:tagLst xmlns:p="http://schemas.openxmlformats.org/presentationml/2006/main">
+<p:tagLst xmlns:a="http://schemas.openxmlformats.org/drawingml/2006/main" xmlns:r="http://schemas.openxmlformats.org/officeDocument/2006/relationships" xmlns:p="http://schemas.openxmlformats.org/presentationml/2006/main">
   <p:tag name="KSO_WM_BEAUTIFY_FLAG" val=""/>
 </p:tagLst>
 </file>
 
 <file path=ppt/tags/tag28.xml><?xml version="1.0" encoding="utf-8"?>
-<p:tagLst xmlns:p="http://schemas.openxmlformats.org/presentationml/2006/main">
+<p:tagLst xmlns:a="http://schemas.openxmlformats.org/drawingml/2006/main" xmlns:r="http://schemas.openxmlformats.org/officeDocument/2006/relationships" xmlns:p="http://schemas.openxmlformats.org/presentationml/2006/main">
   <p:tag name="KSO_WM_BEAUTIFY_FLAG" val=""/>
 </p:tagLst>
 </file>
 
 <file path=ppt/tags/tag29.xml><?xml version="1.0" encoding="utf-8"?>
-<p:tagLst xmlns:p="http://schemas.openxmlformats.org/presentationml/2006/main">
+<p:tagLst xmlns:a="http://schemas.openxmlformats.org/drawingml/2006/main" xmlns:r="http://schemas.openxmlformats.org/officeDocument/2006/relationships" xmlns:p="http://schemas.openxmlformats.org/presentationml/2006/main">
   <p:tag name="KSO_WM_BEAUTIFY_FLAG" val=""/>
 </p:tagLst>
 </file>
 
 <file path=ppt/tags/tag3.xml><?xml version="1.0" encoding="utf-8"?>
-<p:tagLst xmlns:p="http://schemas.openxmlformats.org/presentationml/2006/main">
+<p:tagLst xmlns:a="http://schemas.openxmlformats.org/drawingml/2006/main" xmlns:r="http://schemas.openxmlformats.org/officeDocument/2006/relationships" xmlns:p="http://schemas.openxmlformats.org/presentationml/2006/main">
   <p:tag name="KSO_WM_BEAUTIFY_FLAG" val=""/>
 </p:tagLst>
 </file>
 
 <file path=ppt/tags/tag30.xml><?xml version="1.0" encoding="utf-8"?>
-<p:tagLst xmlns:p="http://schemas.openxmlformats.org/presentationml/2006/main">
+<p:tagLst xmlns:a="http://schemas.openxmlformats.org/drawingml/2006/main" xmlns:r="http://schemas.openxmlformats.org/officeDocument/2006/relationships" xmlns:p="http://schemas.openxmlformats.org/presentationml/2006/main">
   <p:tag name="KSO_WM_BEAUTIFY_FLAG" val=""/>
 </p:tagLst>
 </file>
 
 <file path=ppt/tags/tag31.xml><?xml version="1.0" encoding="utf-8"?>
-<p:tagLst xmlns:p="http://schemas.openxmlformats.org/presentationml/2006/main">
+<p:tagLst xmlns:a="http://schemas.openxmlformats.org/drawingml/2006/main" xmlns:r="http://schemas.openxmlformats.org/officeDocument/2006/relationships" xmlns:p="http://schemas.openxmlformats.org/presentationml/2006/main">
   <p:tag name="KSO_WM_BEAUTIFY_FLAG" val=""/>
 </p:tagLst>
 </file>
 
 <file path=ppt/tags/tag32.xml><?xml version="1.0" encoding="utf-8"?>
-<p:tagLst xmlns:p="http://schemas.openxmlformats.org/presentationml/2006/main">
+<p:tagLst xmlns:a="http://schemas.openxmlformats.org/drawingml/2006/main" xmlns:r="http://schemas.openxmlformats.org/officeDocument/2006/relationships" xmlns:p="http://schemas.openxmlformats.org/presentationml/2006/main">
   <p:tag name="KSO_WM_BEAUTIFY_FLAG" val=""/>
 </p:tagLst>
 </file>
 
 <file path=ppt/tags/tag33.xml><?xml version="1.0" encoding="utf-8"?>
-<p:tagLst xmlns:p="http://schemas.openxmlformats.org/presentationml/2006/main">
+<p:tagLst xmlns:a="http://schemas.openxmlformats.org/drawingml/2006/main" xmlns:r="http://schemas.openxmlformats.org/officeDocument/2006/relationships" xmlns:p="http://schemas.openxmlformats.org/presentationml/2006/main">
   <p:tag name="KSO_WM_BEAUTIFY_FLAG" val=""/>
 </p:tagLst>
 </file>
 
-<file path=ppt/tags/tag34.xml><?xml version="1.0" encoding="utf-8"?>
-<p:tagLst xmlns:p="http://schemas.openxmlformats.org/presentationml/2006/main">
-  <p:tag name="KSO_WM_BEAUTIFY_FLAG" val=""/>
-</p:tagLst>
-</file>
-
-<file path=ppt/tags/tag35.xml><?xml version="1.0" encoding="utf-8"?>
-<p:tagLst xmlns:p="http://schemas.openxmlformats.org/presentationml/2006/main">
-  <p:tag name="KSO_WM_BEAUTIFY_FLAG" val=""/>
-</p:tagLst>
-</file>
-
-<file path=ppt/tags/tag36.xml><?xml version="1.0" encoding="utf-8"?>
-<p:tagLst xmlns:p="http://schemas.openxmlformats.org/presentationml/2006/main">
-  <p:tag name="KSO_WM_BEAUTIFY_FLAG" val=""/>
-</p:tagLst>
-</file>
-
-<file path=ppt/tags/tag37.xml><?xml version="1.0" encoding="utf-8"?>
-<p:tagLst xmlns:p="http://schemas.openxmlformats.org/presentationml/2006/main">
-  <p:tag name="COMMONDATA" val="eyJoZGlkIjoiNWMyNzk1NjJkYjg5Yzk1OTQwMjA3ODhmZjc4ODZlMTgifQ=="/>
-  <p:tag name="KSO_WPP_MARK_KEY" val="19333ca4-0f71-4f1d-900b-60a6380f1e3a"/>
-</p:tagLst>
-</file>
-
 <file path=ppt/tags/tag4.xml><?xml version="1.0" encoding="utf-8"?>
-<p:tagLst xmlns:p="http://schemas.openxmlformats.org/presentationml/2006/main">
+<p:tagLst xmlns:a="http://schemas.openxmlformats.org/drawingml/2006/main" xmlns:r="http://schemas.openxmlformats.org/officeDocument/2006/relationships" xmlns:p="http://schemas.openxmlformats.org/presentationml/2006/main">
   <p:tag name="KSO_WM_BEAUTIFY_FLAG" val=""/>
 </p:tagLst>
 </file>
 
 <file path=ppt/tags/tag5.xml><?xml version="1.0" encoding="utf-8"?>
-<p:tagLst xmlns:p="http://schemas.openxmlformats.org/presentationml/2006/main">
+<p:tagLst xmlns:a="http://schemas.openxmlformats.org/drawingml/2006/main" xmlns:r="http://schemas.openxmlformats.org/officeDocument/2006/relationships" xmlns:p="http://schemas.openxmlformats.org/presentationml/2006/main">
   <p:tag name="KSO_WM_BEAUTIFY_FLAG" val=""/>
 </p:tagLst>
 </file>
 
 <file path=ppt/tags/tag6.xml><?xml version="1.0" encoding="utf-8"?>
-<p:tagLst xmlns:p="http://schemas.openxmlformats.org/presentationml/2006/main">
+<p:tagLst xmlns:a="http://schemas.openxmlformats.org/drawingml/2006/main" xmlns:r="http://schemas.openxmlformats.org/officeDocument/2006/relationships" xmlns:p="http://schemas.openxmlformats.org/presentationml/2006/main">
   <p:tag name="KSO_WM_BEAUTIFY_FLAG" val=""/>
 </p:tagLst>
 </file>
 
 <file path=ppt/tags/tag7.xml><?xml version="1.0" encoding="utf-8"?>
-<p:tagLst xmlns:p="http://schemas.openxmlformats.org/presentationml/2006/main">
+<p:tagLst xmlns:a="http://schemas.openxmlformats.org/drawingml/2006/main" xmlns:r="http://schemas.openxmlformats.org/officeDocument/2006/relationships" xmlns:p="http://schemas.openxmlformats.org/presentationml/2006/main">
   <p:tag name="KSO_WM_BEAUTIFY_FLAG" val=""/>
 </p:tagLst>
 </file>
 
 <file path=ppt/tags/tag8.xml><?xml version="1.0" encoding="utf-8"?>
-<p:tagLst xmlns:p="http://schemas.openxmlformats.org/presentationml/2006/main">
+<p:tagLst xmlns:a="http://schemas.openxmlformats.org/drawingml/2006/main" xmlns:r="http://schemas.openxmlformats.org/officeDocument/2006/relationships" xmlns:p="http://schemas.openxmlformats.org/presentationml/2006/main">
   <p:tag name="KSO_WM_BEAUTIFY_FLAG" val=""/>
 </p:tagLst>
 </file>
 
 <file path=ppt/tags/tag9.xml><?xml version="1.0" encoding="utf-8"?>
-<p:tagLst xmlns:p="http://schemas.openxmlformats.org/presentationml/2006/main">
+<p:tagLst xmlns:a="http://schemas.openxmlformats.org/drawingml/2006/main" xmlns:r="http://schemas.openxmlformats.org/officeDocument/2006/relationships" xmlns:p="http://schemas.openxmlformats.org/presentationml/2006/main">
   <p:tag name="KSO_WM_BEAUTIFY_FLAG" val=""/>
 </p:tagLst>
 </file>
@@ -6352,6 +6116,8 @@
       </a:bgFillStyleLst>
     </a:fmtScheme>
   </a:themeElements>
+  <a:objectDefaults/>
+  <a:extraClrSchemeLst/>
   <a:extLst>
     <a:ext uri="{05A4C25C-085E-4340-85A3-A5531E510DB2}">
       <thm15:themeFamily xmlns:thm15="http://schemas.microsoft.com/office/thememl/2012/main" name="Office Theme" id="{62F939B6-93AF-4DB8-9C6B-D6C7DFDC589F}" vid="{4A3C46E8-61CC-4603-A589-7422A47A8E4A}"/>

</xml_diff>